<commit_message>
add some pptx stuff and things
</commit_message>
<xml_diff>
--- a/PowerShell Fundamentals.pptx
+++ b/PowerShell Fundamentals.pptx
@@ -404,7 +404,7 @@
           <a:p>
             <a:fld id="{11BE664F-9A4E-421C-8905-E251DED2D814}" type="datetimeFigureOut">
               <a:rPr lang="en-SE" smtClean="0"/>
-              <a:t>2025-01-17</a:t>
+              <a:t>2025-01-22</a:t>
             </a:fld>
             <a:endParaRPr lang="en-SE"/>
           </a:p>
@@ -8708,6 +8708,41 @@
               <a:rPr lang="en-GB" dirty="0">
                 <a:latin typeface="Arial" panose="020B0604020202020204" pitchFamily="34" charset="0"/>
               </a:rPr>
+              <a:t>Elias Tångring</a:t>
+            </a:r>
+          </a:p>
+          <a:p>
+            <a:pPr lvl="1"/>
+            <a:r>
+              <a:rPr lang="en-GB" b="0" i="0" u="none" strike="noStrike" baseline="0" dirty="0" err="1">
+                <a:latin typeface="Arial" panose="020B0604020202020204" pitchFamily="34" charset="0"/>
+                <a:hlinkClick r:id="rId4"/>
+              </a:rPr>
+              <a:t>Elias.tangring@</a:t>
+            </a:r>
+            <a:r>
+              <a:rPr lang="en-GB" b="0" i="0" u="none" strike="noStrike" baseline="0" err="1">
+                <a:latin typeface="Arial" panose="020B0604020202020204" pitchFamily="34" charset="0"/>
+                <a:hlinkClick r:id="rId4"/>
+              </a:rPr>
+              <a:t>advania</a:t>
+            </a:r>
+            <a:r>
+              <a:rPr lang="en-GB" b="0" i="0" u="none" strike="noStrike" baseline="0">
+                <a:latin typeface="Arial" panose="020B0604020202020204" pitchFamily="34" charset="0"/>
+                <a:hlinkClick r:id="rId4"/>
+              </a:rPr>
+              <a:t>.se</a:t>
+            </a:r>
+            <a:endParaRPr lang="en-GB" b="0" i="0" u="none" strike="noStrike" baseline="0" dirty="0">
+              <a:latin typeface="Arial" panose="020B0604020202020204" pitchFamily="34" charset="0"/>
+            </a:endParaRPr>
+          </a:p>
+          <a:p>
+            <a:r>
+              <a:rPr lang="en-GB" dirty="0">
+                <a:latin typeface="Arial" panose="020B0604020202020204" pitchFamily="34" charset="0"/>
+              </a:rPr>
               <a:t>You?</a:t>
             </a:r>
           </a:p>
@@ -14355,26 +14390,17 @@
               <a:rPr lang="en-US" b="0" i="0" u="none" strike="noStrike" baseline="0" dirty="0">
                 <a:latin typeface="Arial" panose="020B0604020202020204" pitchFamily="34" charset="0"/>
               </a:rPr>
-              <a:t>1..10 | Foreach-Object</a:t>
-            </a:r>
-          </a:p>
-          <a:p>
-            <a:pPr lvl="1"/>
-            <a:r>
-              <a:rPr lang="en-US" b="0" i="0" u="none" strike="noStrike" baseline="0" dirty="0">
-                <a:latin typeface="Arial" panose="020B0604020202020204" pitchFamily="34" charset="0"/>
-              </a:rPr>
-              <a:t>if</a:t>
-            </a:r>
-          </a:p>
-          <a:p>
-            <a:pPr lvl="1"/>
-            <a:r>
-              <a:rPr lang="en-US" b="0" i="0" u="none" strike="noStrike" baseline="0" dirty="0">
-                <a:latin typeface="Arial" panose="020B0604020202020204" pitchFamily="34" charset="0"/>
-              </a:rPr>
-              <a:t>switch</a:t>
-            </a:r>
+              <a:t>1..10 </a:t>
+            </a:r>
+            <a:r>
+              <a:rPr lang="en-US" b="0" i="0" u="none" strike="noStrike" baseline="0">
+                <a:latin typeface="Arial" panose="020B0604020202020204" pitchFamily="34" charset="0"/>
+              </a:rPr>
+              <a:t>| Foreach-Object</a:t>
+            </a:r>
+            <a:endParaRPr lang="en-US" b="0" i="0" u="none" strike="noStrike" baseline="0" dirty="0">
+              <a:latin typeface="Arial" panose="020B0604020202020204" pitchFamily="34" charset="0"/>
+            </a:endParaRPr>
           </a:p>
           <a:p>
             <a:pPr marR="0" lvl="0" rtl="0"/>

</xml_diff>

<commit_message>
Lab 9 - Add [string] methods according to #9
</commit_message>
<xml_diff>
--- a/PowerShell Fundamentals.pptx
+++ b/PowerShell Fundamentals.pptx
@@ -5,7 +5,7 @@
     <p:sldMasterId id="2147483648" r:id="rId1"/>
   </p:sldMasterIdLst>
   <p:notesMasterIdLst>
-    <p:notesMasterId r:id="rId77"/>
+    <p:notesMasterId r:id="rId78"/>
   </p:notesMasterIdLst>
   <p:sldIdLst>
     <p:sldId id="256" r:id="rId2"/>
@@ -65,24 +65,25 @@
     <p:sldId id="384" r:id="rId56"/>
     <p:sldId id="385" r:id="rId57"/>
     <p:sldId id="393" r:id="rId58"/>
-    <p:sldId id="395" r:id="rId59"/>
-    <p:sldId id="396" r:id="rId60"/>
-    <p:sldId id="397" r:id="rId61"/>
-    <p:sldId id="394" r:id="rId62"/>
-    <p:sldId id="386" r:id="rId63"/>
-    <p:sldId id="387" r:id="rId64"/>
-    <p:sldId id="388" r:id="rId65"/>
-    <p:sldId id="398" r:id="rId66"/>
-    <p:sldId id="399" r:id="rId67"/>
-    <p:sldId id="353" r:id="rId68"/>
-    <p:sldId id="354" r:id="rId69"/>
-    <p:sldId id="356" r:id="rId70"/>
-    <p:sldId id="357" r:id="rId71"/>
-    <p:sldId id="400" r:id="rId72"/>
-    <p:sldId id="362" r:id="rId73"/>
-    <p:sldId id="363" r:id="rId74"/>
-    <p:sldId id="364" r:id="rId75"/>
-    <p:sldId id="333" r:id="rId76"/>
+    <p:sldId id="406" r:id="rId59"/>
+    <p:sldId id="395" r:id="rId60"/>
+    <p:sldId id="396" r:id="rId61"/>
+    <p:sldId id="397" r:id="rId62"/>
+    <p:sldId id="394" r:id="rId63"/>
+    <p:sldId id="386" r:id="rId64"/>
+    <p:sldId id="387" r:id="rId65"/>
+    <p:sldId id="388" r:id="rId66"/>
+    <p:sldId id="398" r:id="rId67"/>
+    <p:sldId id="399" r:id="rId68"/>
+    <p:sldId id="353" r:id="rId69"/>
+    <p:sldId id="354" r:id="rId70"/>
+    <p:sldId id="356" r:id="rId71"/>
+    <p:sldId id="357" r:id="rId72"/>
+    <p:sldId id="400" r:id="rId73"/>
+    <p:sldId id="362" r:id="rId74"/>
+    <p:sldId id="363" r:id="rId75"/>
+    <p:sldId id="364" r:id="rId76"/>
+    <p:sldId id="333" r:id="rId77"/>
   </p:sldIdLst>
   <p:sldSz cx="12192000" cy="6858000"/>
   <p:notesSz cx="6858000" cy="9144000"/>
@@ -283,6 +284,7 @@
             <p14:sldId id="384"/>
             <p14:sldId id="385"/>
             <p14:sldId id="393"/>
+            <p14:sldId id="406"/>
             <p14:sldId id="395"/>
             <p14:sldId id="396"/>
             <p14:sldId id="397"/>
@@ -414,7 +416,7 @@
           <a:p>
             <a:fld id="{11BE664F-9A4E-421C-8905-E251DED2D814}" type="datetimeFigureOut">
               <a:rPr lang="en-SE" smtClean="0"/>
-              <a:t>2025-02-03</a:t>
+              <a:t>2025-02-14</a:t>
             </a:fld>
             <a:endParaRPr lang="en-SE"/>
           </a:p>
@@ -771,7 +773,7 @@
           <a:p>
             <a:fld id="{19592BCA-B8D7-4059-A661-C132E0F5E2FC}" type="slidenum">
               <a:rPr lang="en-SE" smtClean="0"/>
-              <a:t>71</a:t>
+              <a:t>72</a:t>
             </a:fld>
             <a:endParaRPr lang="en-SE"/>
           </a:p>
@@ -15702,7 +15704,13 @@
   <p:cSld>
     <p:spTree>
       <p:nvGrpSpPr>
-        <p:cNvPr id="1" name=""/>
+        <p:cNvPr id="1" name="">
+          <a:extLst>
+            <a:ext uri="{FF2B5EF4-FFF2-40B4-BE49-F238E27FC236}">
+              <a16:creationId xmlns:a16="http://schemas.microsoft.com/office/drawing/2014/main" id="{E0BA1FC2-23BE-057B-AAEE-420B12C61407}"/>
+            </a:ext>
+          </a:extLst>
+        </p:cNvPr>
         <p:cNvGrpSpPr/>
         <p:nvPr/>
       </p:nvGrpSpPr>
@@ -15719,7 +15727,7 @@
           <p:cNvPr id="2" name="Title 1">
             <a:extLst>
               <a:ext uri="{FF2B5EF4-FFF2-40B4-BE49-F238E27FC236}">
-                <a16:creationId xmlns:a16="http://schemas.microsoft.com/office/drawing/2014/main" id="{020D5667-3F2E-0371-B2AF-410D252A6CEA}"/>
+                <a16:creationId xmlns:a16="http://schemas.microsoft.com/office/drawing/2014/main" id="{D4634EA4-4B24-DC45-5A06-57715A048280}"/>
               </a:ext>
             </a:extLst>
           </p:cNvPr>
@@ -15758,7 +15766,7 @@
           <p:cNvPr id="3" name="Text Placeholder 2">
             <a:extLst>
               <a:ext uri="{FF2B5EF4-FFF2-40B4-BE49-F238E27FC236}">
-                <a16:creationId xmlns:a16="http://schemas.microsoft.com/office/drawing/2014/main" id="{14842F41-DE27-3397-05EB-81DCA4DF63A8}"/>
+                <a16:creationId xmlns:a16="http://schemas.microsoft.com/office/drawing/2014/main" id="{CF927741-F1EA-AF27-7551-6B5C63218065}"/>
               </a:ext>
             </a:extLst>
           </p:cNvPr>
@@ -15776,92 +15784,79 @@
           </a:bodyPr>
           <a:lstStyle/>
           <a:p>
-            <a:pPr marR="0" lvl="0" rtl="0"/>
             <a:r>
               <a:rPr lang="en-US" b="0" i="0" u="none" strike="noStrike" baseline="0" dirty="0">
                 <a:latin typeface="Arial" panose="020B0604020202020204" pitchFamily="34" charset="0"/>
               </a:rPr>
-              <a:t>Conditions</a:t>
+              <a:t>Comparisons</a:t>
+            </a:r>
+            <a:r>
+              <a:rPr lang="en-US" dirty="0">
+                <a:latin typeface="Arial" panose="020B0604020202020204" pitchFamily="34" charset="0"/>
+              </a:rPr>
+              <a:t> with empty values</a:t>
             </a:r>
           </a:p>
           <a:p>
             <a:pPr lvl="1"/>
             <a:r>
-              <a:rPr lang="en-US" b="0" i="0" u="none" strike="noStrike" baseline="0" dirty="0">
-                <a:latin typeface="Arial" panose="020B0604020202020204" pitchFamily="34" charset="0"/>
-              </a:rPr>
-              <a:t>Operators</a:t>
+              <a:rPr lang="en-US" dirty="0">
+                <a:latin typeface="Arial" panose="020B0604020202020204" pitchFamily="34" charset="0"/>
+              </a:rPr>
+              <a:t>[string]::</a:t>
+            </a:r>
+            <a:r>
+              <a:rPr lang="en-US" dirty="0" err="1">
+                <a:latin typeface="Arial" panose="020B0604020202020204" pitchFamily="34" charset="0"/>
+              </a:rPr>
+              <a:t>IsNullOrEmpty</a:t>
+            </a:r>
+            <a:r>
+              <a:rPr lang="en-US" dirty="0">
+                <a:latin typeface="Arial" panose="020B0604020202020204" pitchFamily="34" charset="0"/>
+              </a:rPr>
+              <a:t>()</a:t>
+            </a:r>
+          </a:p>
+          <a:p>
+            <a:pPr lvl="1"/>
+            <a:r>
+              <a:rPr lang="en-US" dirty="0">
+                <a:latin typeface="Arial" panose="020B0604020202020204" pitchFamily="34" charset="0"/>
+              </a:rPr>
+              <a:t>[string]::</a:t>
+            </a:r>
+            <a:r>
+              <a:rPr lang="en-US" dirty="0" err="1">
+                <a:latin typeface="Arial" panose="020B0604020202020204" pitchFamily="34" charset="0"/>
+              </a:rPr>
+              <a:t>IsNullOrWhiteSpace</a:t>
+            </a:r>
+            <a:r>
+              <a:rPr lang="en-US" dirty="0">
+                <a:latin typeface="Arial" panose="020B0604020202020204" pitchFamily="34" charset="0"/>
+              </a:rPr>
+              <a:t>()</a:t>
             </a:r>
           </a:p>
           <a:p>
             <a:pPr lvl="2"/>
             <a:r>
-              <a:rPr lang="en-US" b="0" i="0" u="none" strike="noStrike" baseline="0" dirty="0">
-                <a:latin typeface="Arial" panose="020B0604020202020204" pitchFamily="34" charset="0"/>
-              </a:rPr>
-              <a:t>Logical</a:t>
-            </a:r>
-          </a:p>
-          <a:p>
-            <a:pPr lvl="3"/>
-            <a:r>
-              <a:rPr lang="en-US" b="0" i="0" u="none" strike="noStrike" baseline="0" dirty="0">
-                <a:latin typeface="Arial" panose="020B0604020202020204" pitchFamily="34" charset="0"/>
-              </a:rPr>
-              <a:t>-and / -or</a:t>
-            </a:r>
-          </a:p>
-          <a:p>
-            <a:pPr lvl="3"/>
-            <a:r>
-              <a:rPr lang="en-US" b="0" i="0" u="none" strike="noStrike" baseline="0" dirty="0">
-                <a:latin typeface="Arial" panose="020B0604020202020204" pitchFamily="34" charset="0"/>
-              </a:rPr>
-              <a:t>-not</a:t>
-            </a:r>
-          </a:p>
-          <a:p>
-            <a:pPr lvl="2"/>
-            <a:r>
-              <a:rPr lang="en-US" b="0" i="0" u="none" strike="noStrike" baseline="0" dirty="0">
-                <a:latin typeface="Arial" panose="020B0604020202020204" pitchFamily="34" charset="0"/>
-              </a:rPr>
-              <a:t>Range</a:t>
-            </a:r>
-          </a:p>
-          <a:p>
-            <a:pPr lvl="3"/>
-            <a:r>
               <a:rPr lang="en-US" dirty="0">
                 <a:latin typeface="Arial" panose="020B0604020202020204" pitchFamily="34" charset="0"/>
               </a:rPr>
-              <a:t>[0..10]</a:t>
-            </a:r>
-          </a:p>
-          <a:p>
-            <a:pPr lvl="3"/>
-            <a:r>
-              <a:rPr lang="en-US" b="0" i="0" u="none" strike="noStrike" baseline="0" dirty="0">
-                <a:latin typeface="Arial" panose="020B0604020202020204" pitchFamily="34" charset="0"/>
-              </a:rPr>
-              <a:t>1..10 </a:t>
-            </a:r>
-            <a:r>
-              <a:rPr lang="en-US" b="0" i="0" u="none" strike="noStrike" baseline="0">
-                <a:latin typeface="Arial" panose="020B0604020202020204" pitchFamily="34" charset="0"/>
-              </a:rPr>
-              <a:t>| Foreach-Object</a:t>
-            </a:r>
-            <a:endParaRPr lang="en-US" b="0" i="0" u="none" strike="noStrike" baseline="0" dirty="0">
+              <a:t>Both better than $null –eq ‘’ or ‘’ –eq </a:t>
+            </a:r>
+            <a:r>
+              <a:rPr lang="en-US">
+                <a:latin typeface="Arial" panose="020B0604020202020204" pitchFamily="34" charset="0"/>
+              </a:rPr>
+              <a:t>$variable</a:t>
+            </a:r>
+            <a:endParaRPr lang="en-US" dirty="0">
               <a:latin typeface="Arial" panose="020B0604020202020204" pitchFamily="34" charset="0"/>
             </a:endParaRPr>
           </a:p>
-          <a:p>
-            <a:pPr marR="0" lvl="0" rtl="0"/>
-            <a:endParaRPr lang="en-US" b="0" i="0" u="none" strike="noStrike" baseline="0" dirty="0">
-              <a:latin typeface="Arial" panose="020B0604020202020204" pitchFamily="34" charset="0"/>
-            </a:endParaRPr>
-          </a:p>
         </p:txBody>
       </p:sp>
       <p:sp>
@@ -15869,7 +15864,7 @@
           <p:cNvPr id="4" name="Footer Placeholder 3">
             <a:extLst>
               <a:ext uri="{FF2B5EF4-FFF2-40B4-BE49-F238E27FC236}">
-                <a16:creationId xmlns:a16="http://schemas.microsoft.com/office/drawing/2014/main" id="{DFC4B1A9-C5E5-6767-5A67-3AFFF61F8AE3}"/>
+                <a16:creationId xmlns:a16="http://schemas.microsoft.com/office/drawing/2014/main" id="{CB98A46B-EF73-1315-810D-DDEE5436AAA9}"/>
               </a:ext>
             </a:extLst>
           </p:cNvPr>
@@ -15898,7 +15893,7 @@
           <p:cNvPr id="5" name="Slide Number Placeholder 4">
             <a:extLst>
               <a:ext uri="{FF2B5EF4-FFF2-40B4-BE49-F238E27FC236}">
-                <a16:creationId xmlns:a16="http://schemas.microsoft.com/office/drawing/2014/main" id="{BAD258B7-9534-6ABE-261E-70D2894B8FD8}"/>
+                <a16:creationId xmlns:a16="http://schemas.microsoft.com/office/drawing/2014/main" id="{A45F80C0-2D8F-561F-5564-9DD4973868B2}"/>
               </a:ext>
             </a:extLst>
           </p:cNvPr>
@@ -15925,7 +15920,7 @@
     </p:spTree>
     <p:extLst>
       <p:ext uri="{BB962C8B-B14F-4D97-AF65-F5344CB8AC3E}">
-        <p14:creationId xmlns:p14="http://schemas.microsoft.com/office/powerpoint/2010/main" val="1039817472"/>
+        <p14:creationId xmlns:p14="http://schemas.microsoft.com/office/powerpoint/2010/main" val="3954842743"/>
       </p:ext>
     </p:extLst>
   </p:cSld>
@@ -16037,7 +16032,25 @@
               <a:rPr lang="en-US" b="0" i="0" u="none" strike="noStrike" baseline="0" dirty="0">
                 <a:latin typeface="Arial" panose="020B0604020202020204" pitchFamily="34" charset="0"/>
               </a:rPr>
-              <a:t>Explicit / Implicit type casting</a:t>
+              <a:t>Logical</a:t>
+            </a:r>
+          </a:p>
+          <a:p>
+            <a:pPr lvl="3"/>
+            <a:r>
+              <a:rPr lang="en-US" b="0" i="0" u="none" strike="noStrike" baseline="0" dirty="0">
+                <a:latin typeface="Arial" panose="020B0604020202020204" pitchFamily="34" charset="0"/>
+              </a:rPr>
+              <a:t>-and / -or</a:t>
+            </a:r>
+          </a:p>
+          <a:p>
+            <a:pPr lvl="3"/>
+            <a:r>
+              <a:rPr lang="en-US" b="0" i="0" u="none" strike="noStrike" baseline="0" dirty="0">
+                <a:latin typeface="Arial" panose="020B0604020202020204" pitchFamily="34" charset="0"/>
+              </a:rPr>
+              <a:t>-not</a:t>
             </a:r>
           </a:p>
           <a:p>
@@ -16046,8 +16059,41 @@
               <a:rPr lang="en-US" b="0" i="0" u="none" strike="noStrike" baseline="0" dirty="0">
                 <a:latin typeface="Arial" panose="020B0604020202020204" pitchFamily="34" charset="0"/>
               </a:rPr>
-              <a:t>$null on left side, always!</a:t>
-            </a:r>
+              <a:t>Range</a:t>
+            </a:r>
+          </a:p>
+          <a:p>
+            <a:pPr lvl="3"/>
+            <a:r>
+              <a:rPr lang="en-US" dirty="0">
+                <a:latin typeface="Arial" panose="020B0604020202020204" pitchFamily="34" charset="0"/>
+              </a:rPr>
+              <a:t>[0..10]</a:t>
+            </a:r>
+          </a:p>
+          <a:p>
+            <a:pPr lvl="3"/>
+            <a:r>
+              <a:rPr lang="en-US" b="0" i="0" u="none" strike="noStrike" baseline="0" dirty="0">
+                <a:latin typeface="Arial" panose="020B0604020202020204" pitchFamily="34" charset="0"/>
+              </a:rPr>
+              <a:t>1..10 </a:t>
+            </a:r>
+            <a:r>
+              <a:rPr lang="en-US" b="0" i="0" u="none" strike="noStrike" baseline="0">
+                <a:latin typeface="Arial" panose="020B0604020202020204" pitchFamily="34" charset="0"/>
+              </a:rPr>
+              <a:t>| Foreach-Object</a:t>
+            </a:r>
+            <a:endParaRPr lang="en-US" b="0" i="0" u="none" strike="noStrike" baseline="0" dirty="0">
+              <a:latin typeface="Arial" panose="020B0604020202020204" pitchFamily="34" charset="0"/>
+            </a:endParaRPr>
+          </a:p>
+          <a:p>
+            <a:pPr marR="0" lvl="0" rtl="0"/>
+            <a:endParaRPr lang="en-US" b="0" i="0" u="none" strike="noStrike" baseline="0" dirty="0">
+              <a:latin typeface="Arial" panose="020B0604020202020204" pitchFamily="34" charset="0"/>
+            </a:endParaRPr>
           </a:p>
         </p:txBody>
       </p:sp>
@@ -16112,7 +16158,7 @@
     </p:spTree>
     <p:extLst>
       <p:ext uri="{BB962C8B-B14F-4D97-AF65-F5344CB8AC3E}">
-        <p14:creationId xmlns:p14="http://schemas.microsoft.com/office/powerpoint/2010/main" val="1378003133"/>
+        <p14:creationId xmlns:p14="http://schemas.microsoft.com/office/powerpoint/2010/main" val="1039817472"/>
       </p:ext>
     </p:extLst>
   </p:cSld>
@@ -16441,35 +16487,26 @@
               <a:rPr lang="en-US" b="0" i="0" u="none" strike="noStrike" baseline="0" dirty="0">
                 <a:latin typeface="Arial" panose="020B0604020202020204" pitchFamily="34" charset="0"/>
               </a:rPr>
-              <a:t>if</a:t>
-            </a:r>
-          </a:p>
-          <a:p>
-            <a:pPr lvl="1"/>
+              <a:t>Operators</a:t>
+            </a:r>
+          </a:p>
+          <a:p>
+            <a:pPr lvl="2"/>
             <a:r>
               <a:rPr lang="en-US" b="0" i="0" u="none" strike="noStrike" baseline="0" dirty="0">
                 <a:latin typeface="Arial" panose="020B0604020202020204" pitchFamily="34" charset="0"/>
               </a:rPr>
-              <a:t>Switch</a:t>
+              <a:t>Explicit / Implicit type casting</a:t>
             </a:r>
           </a:p>
           <a:p>
             <a:pPr lvl="2"/>
             <a:r>
-              <a:rPr lang="en-US" dirty="0">
-                <a:latin typeface="Arial" panose="020B0604020202020204" pitchFamily="34" charset="0"/>
-              </a:rPr>
-              <a:t>-Regex</a:t>
-            </a:r>
-            <a:endParaRPr lang="en-US" b="0" i="0" u="none" strike="noStrike" baseline="0" dirty="0">
-              <a:latin typeface="Arial" panose="020B0604020202020204" pitchFamily="34" charset="0"/>
-            </a:endParaRPr>
-          </a:p>
-          <a:p>
-            <a:pPr marR="0" lvl="0" rtl="0"/>
-            <a:endParaRPr lang="en-US" b="0" i="0" u="none" strike="noStrike" baseline="0" dirty="0">
-              <a:latin typeface="Arial" panose="020B0604020202020204" pitchFamily="34" charset="0"/>
-            </a:endParaRPr>
+              <a:rPr lang="en-US" b="0" i="0" u="none" strike="noStrike" baseline="0" dirty="0">
+                <a:latin typeface="Arial" panose="020B0604020202020204" pitchFamily="34" charset="0"/>
+              </a:rPr>
+              <a:t>$null on left side, always!</a:t>
+            </a:r>
           </a:p>
         </p:txBody>
       </p:sp>
@@ -16534,7 +16571,7 @@
     </p:spTree>
     <p:extLst>
       <p:ext uri="{BB962C8B-B14F-4D97-AF65-F5344CB8AC3E}">
-        <p14:creationId xmlns:p14="http://schemas.microsoft.com/office/powerpoint/2010/main" val="145947229"/>
+        <p14:creationId xmlns:p14="http://schemas.microsoft.com/office/powerpoint/2010/main" val="1378003133"/>
       </p:ext>
     </p:extLst>
   </p:cSld>
@@ -16628,7 +16665,7 @@
               <a:rPr lang="en-US" b="0" i="0" u="none" strike="noStrike" baseline="0" dirty="0">
                 <a:latin typeface="Arial" panose="020B0604020202020204" pitchFamily="34" charset="0"/>
               </a:rPr>
-              <a:t>Loops with Conditions</a:t>
+              <a:t>Conditions</a:t>
             </a:r>
           </a:p>
           <a:p>
@@ -16637,7 +16674,7 @@
               <a:rPr lang="en-US" b="0" i="0" u="none" strike="noStrike" baseline="0" dirty="0">
                 <a:latin typeface="Arial" panose="020B0604020202020204" pitchFamily="34" charset="0"/>
               </a:rPr>
-              <a:t>while</a:t>
+              <a:t>if</a:t>
             </a:r>
           </a:p>
           <a:p>
@@ -16646,17 +16683,26 @@
               <a:rPr lang="en-US" b="0" i="0" u="none" strike="noStrike" baseline="0" dirty="0">
                 <a:latin typeface="Arial" panose="020B0604020202020204" pitchFamily="34" charset="0"/>
               </a:rPr>
-              <a:t>do while</a:t>
-            </a:r>
-          </a:p>
-          <a:p>
-            <a:pPr lvl="1"/>
-            <a:r>
-              <a:rPr lang="en-US" b="0" i="0" u="none" strike="noStrike" baseline="0" dirty="0">
-                <a:latin typeface="Arial" panose="020B0604020202020204" pitchFamily="34" charset="0"/>
-              </a:rPr>
-              <a:t>do until</a:t>
-            </a:r>
+              <a:t>Switch</a:t>
+            </a:r>
+          </a:p>
+          <a:p>
+            <a:pPr lvl="2"/>
+            <a:r>
+              <a:rPr lang="en-US" dirty="0">
+                <a:latin typeface="Arial" panose="020B0604020202020204" pitchFamily="34" charset="0"/>
+              </a:rPr>
+              <a:t>-Regex</a:t>
+            </a:r>
+            <a:endParaRPr lang="en-US" b="0" i="0" u="none" strike="noStrike" baseline="0" dirty="0">
+              <a:latin typeface="Arial" panose="020B0604020202020204" pitchFamily="34" charset="0"/>
+            </a:endParaRPr>
+          </a:p>
+          <a:p>
+            <a:pPr marR="0" lvl="0" rtl="0"/>
+            <a:endParaRPr lang="en-US" b="0" i="0" u="none" strike="noStrike" baseline="0" dirty="0">
+              <a:latin typeface="Arial" panose="020B0604020202020204" pitchFamily="34" charset="0"/>
+            </a:endParaRPr>
           </a:p>
         </p:txBody>
       </p:sp>
@@ -16721,7 +16767,7 @@
     </p:spTree>
     <p:extLst>
       <p:ext uri="{BB962C8B-B14F-4D97-AF65-F5344CB8AC3E}">
-        <p14:creationId xmlns:p14="http://schemas.microsoft.com/office/powerpoint/2010/main" val="1504814919"/>
+        <p14:creationId xmlns:p14="http://schemas.microsoft.com/office/powerpoint/2010/main" val="145947229"/>
       </p:ext>
     </p:extLst>
   </p:cSld>
@@ -16753,7 +16799,7 @@
           <p:cNvPr id="2" name="Title 1">
             <a:extLst>
               <a:ext uri="{FF2B5EF4-FFF2-40B4-BE49-F238E27FC236}">
-                <a16:creationId xmlns:a16="http://schemas.microsoft.com/office/drawing/2014/main" id="{69BCD6E1-D5BF-EF3E-F0CC-EDE7BAE35861}"/>
+                <a16:creationId xmlns:a16="http://schemas.microsoft.com/office/drawing/2014/main" id="{020D5667-3F2E-0371-B2AF-410D252A6CEA}"/>
               </a:ext>
             </a:extLst>
           </p:cNvPr>
@@ -16762,110 +16808,97 @@
           </p:cNvSpPr>
           <p:nvPr>
             <p:ph type="title"/>
-          </p:nvPr>
-        </p:nvSpPr>
-        <p:spPr/>
-        <p:txBody>
-          <a:bodyPr/>
-          <a:lstStyle/>
-          <a:p>
-            <a:r>
-              <a:rPr lang="en-GB" b="1" i="0" u="none" strike="noStrike" baseline="0" dirty="0">
-                <a:latin typeface="Arial" panose="020B0604020202020204" pitchFamily="34" charset="0"/>
-              </a:rPr>
-              <a:t>Script Flow</a:t>
-            </a:r>
-            <a:endParaRPr lang="en-SE" dirty="0"/>
-          </a:p>
-        </p:txBody>
-      </p:sp>
-      <p:sp>
-        <p:nvSpPr>
-          <p:cNvPr id="4" name="Text Placeholder 3">
-            <a:extLst>
-              <a:ext uri="{FF2B5EF4-FFF2-40B4-BE49-F238E27FC236}">
-                <a16:creationId xmlns:a16="http://schemas.microsoft.com/office/drawing/2014/main" id="{D7ABE405-4C8C-4761-DB98-41C6649D1B66}"/>
-              </a:ext>
-            </a:extLst>
-          </p:cNvPr>
-          <p:cNvSpPr>
-            <a:spLocks noGrp="1"/>
-          </p:cNvSpPr>
-          <p:nvPr>
-            <p:ph type="body" sz="half" idx="2"/>
           </p:nvPr>
         </p:nvSpPr>
         <p:spPr>
           <a:xfrm>
-            <a:off x="839788" y="2057400"/>
-            <a:ext cx="10877001" cy="3811588"/>
+            <a:off x="838200" y="365125"/>
+            <a:ext cx="10515600" cy="1325563"/>
           </a:xfrm>
         </p:spPr>
+        <p:txBody>
+          <a:bodyPr/>
+          <a:lstStyle/>
+          <a:p>
+            <a:pPr marR="0" rtl="0"/>
+            <a:r>
+              <a:rPr lang="en-GB" b="1" i="0" u="none" strike="noStrike" baseline="0" dirty="0">
+                <a:latin typeface="Arial" panose="020B0604020202020204" pitchFamily="34" charset="0"/>
+              </a:rPr>
+              <a:t>Script Flow</a:t>
+            </a:r>
+            <a:endParaRPr lang="en-GB" b="0" i="0" u="none" strike="noStrike" baseline="0" dirty="0">
+              <a:latin typeface="Arial" panose="020B0604020202020204" pitchFamily="34" charset="0"/>
+            </a:endParaRPr>
+          </a:p>
+        </p:txBody>
+      </p:sp>
+      <p:sp>
+        <p:nvSpPr>
+          <p:cNvPr id="3" name="Text Placeholder 2">
+            <a:extLst>
+              <a:ext uri="{FF2B5EF4-FFF2-40B4-BE49-F238E27FC236}">
+                <a16:creationId xmlns:a16="http://schemas.microsoft.com/office/drawing/2014/main" id="{14842F41-DE27-3397-05EB-81DCA4DF63A8}"/>
+              </a:ext>
+            </a:extLst>
+          </p:cNvPr>
+          <p:cNvSpPr>
+            <a:spLocks noGrp="1"/>
+          </p:cNvSpPr>
+          <p:nvPr>
+            <p:ph type="body" idx="1"/>
+          </p:nvPr>
+        </p:nvSpPr>
+        <p:spPr/>
         <p:txBody>
           <a:bodyPr>
             <a:normAutofit/>
           </a:bodyPr>
           <a:lstStyle/>
           <a:p>
-            <a:pPr marL="285750" indent="-285750">
-              <a:buFont typeface="Arial" panose="020B0604020202020204" pitchFamily="34" charset="0"/>
-              <a:buChar char="•"/>
-            </a:pPr>
-            <a:r>
-              <a:rPr lang="en-GB" sz="4400" b="0" i="0" u="none" strike="noStrike" baseline="0" dirty="0">
-                <a:latin typeface="Arial" panose="020B0604020202020204" pitchFamily="34" charset="0"/>
-              </a:rPr>
-              <a:t>Lab 8</a:t>
-            </a:r>
-          </a:p>
-          <a:p>
-            <a:pPr marL="285750" indent="-285750">
-              <a:buFont typeface="Arial" panose="020B0604020202020204" pitchFamily="34" charset="0"/>
-              <a:buChar char="•"/>
-            </a:pPr>
-            <a:endParaRPr lang="en-GB" sz="4400" b="0" i="0" u="none" strike="noStrike" baseline="0" dirty="0">
-              <a:latin typeface="Arial" panose="020B0604020202020204" pitchFamily="34" charset="0"/>
-            </a:endParaRPr>
-          </a:p>
-          <a:p>
-            <a:pPr marL="285750" indent="-285750">
-              <a:buFont typeface="Arial" panose="020B0604020202020204" pitchFamily="34" charset="0"/>
-              <a:buChar char="•"/>
-            </a:pPr>
-            <a:r>
-              <a:rPr lang="en-US" sz="1800" dirty="0">
-                <a:hlinkClick r:id="rId2"/>
-              </a:rPr>
-              <a:t>https://github.com/AdvaniaSE/PowerShellFundamentals</a:t>
-            </a:r>
-            <a:endParaRPr lang="en-US" sz="1800" dirty="0"/>
-          </a:p>
-          <a:p>
-            <a:pPr marL="742950" lvl="1" indent="-285750">
-              <a:buFont typeface="Arial" panose="020B0604020202020204" pitchFamily="34" charset="0"/>
-              <a:buChar char="•"/>
-            </a:pPr>
-            <a:r>
-              <a:rPr lang="en-US" dirty="0"/>
-              <a:t>08. Conditions &amp; Loops</a:t>
-            </a:r>
-            <a:endParaRPr lang="en-SE" dirty="0"/>
-          </a:p>
-          <a:p>
-            <a:pPr marL="285750" indent="-285750">
-              <a:buFont typeface="Arial" panose="020B0604020202020204" pitchFamily="34" charset="0"/>
-              <a:buChar char="•"/>
-            </a:pPr>
-            <a:endParaRPr lang="en-US" sz="1800" dirty="0"/>
-          </a:p>
-        </p:txBody>
-      </p:sp>
-      <p:sp>
-        <p:nvSpPr>
-          <p:cNvPr id="3" name="Footer Placeholder 2">
-            <a:extLst>
-              <a:ext uri="{FF2B5EF4-FFF2-40B4-BE49-F238E27FC236}">
-                <a16:creationId xmlns:a16="http://schemas.microsoft.com/office/drawing/2014/main" id="{1FAF7DB9-64B0-07FB-79A4-DC2D599FF636}"/>
+            <a:pPr marR="0" lvl="0" rtl="0"/>
+            <a:r>
+              <a:rPr lang="en-US" b="0" i="0" u="none" strike="noStrike" baseline="0" dirty="0">
+                <a:latin typeface="Arial" panose="020B0604020202020204" pitchFamily="34" charset="0"/>
+              </a:rPr>
+              <a:t>Loops with Conditions</a:t>
+            </a:r>
+          </a:p>
+          <a:p>
+            <a:pPr lvl="1"/>
+            <a:r>
+              <a:rPr lang="en-US" b="0" i="0" u="none" strike="noStrike" baseline="0" dirty="0">
+                <a:latin typeface="Arial" panose="020B0604020202020204" pitchFamily="34" charset="0"/>
+              </a:rPr>
+              <a:t>while</a:t>
+            </a:r>
+          </a:p>
+          <a:p>
+            <a:pPr lvl="1"/>
+            <a:r>
+              <a:rPr lang="en-US" b="0" i="0" u="none" strike="noStrike" baseline="0" dirty="0">
+                <a:latin typeface="Arial" panose="020B0604020202020204" pitchFamily="34" charset="0"/>
+              </a:rPr>
+              <a:t>do while</a:t>
+            </a:r>
+          </a:p>
+          <a:p>
+            <a:pPr lvl="1"/>
+            <a:r>
+              <a:rPr lang="en-US" b="0" i="0" u="none" strike="noStrike" baseline="0" dirty="0">
+                <a:latin typeface="Arial" panose="020B0604020202020204" pitchFamily="34" charset="0"/>
+              </a:rPr>
+              <a:t>do until</a:t>
+            </a:r>
+          </a:p>
+        </p:txBody>
+      </p:sp>
+      <p:sp>
+        <p:nvSpPr>
+          <p:cNvPr id="4" name="Footer Placeholder 3">
+            <a:extLst>
+              <a:ext uri="{FF2B5EF4-FFF2-40B4-BE49-F238E27FC236}">
+                <a16:creationId xmlns:a16="http://schemas.microsoft.com/office/drawing/2014/main" id="{DFC4B1A9-C5E5-6767-5A67-3AFFF61F8AE3}"/>
               </a:ext>
             </a:extLst>
           </p:cNvPr>
@@ -16894,7 +16927,7 @@
           <p:cNvPr id="5" name="Slide Number Placeholder 4">
             <a:extLst>
               <a:ext uri="{FF2B5EF4-FFF2-40B4-BE49-F238E27FC236}">
-                <a16:creationId xmlns:a16="http://schemas.microsoft.com/office/drawing/2014/main" id="{2C2623BC-FCDC-B4EF-82B9-EC9076C892AE}"/>
+                <a16:creationId xmlns:a16="http://schemas.microsoft.com/office/drawing/2014/main" id="{BAD258B7-9534-6ABE-261E-70D2894B8FD8}"/>
               </a:ext>
             </a:extLst>
           </p:cNvPr>
@@ -16910,7 +16943,7 @@
           <a:bodyPr/>
           <a:lstStyle/>
           <a:p>
-            <a:fld id="{BFEA1545-8540-491B-83AB-51C306516EA6}" type="slidenum">
+            <a:fld id="{9993A830-6DA6-4394-A358-10250CDB3A67}" type="slidenum">
               <a:rPr lang="en-SE" smtClean="0"/>
               <a:t>62</a:t>
             </a:fld>
@@ -16921,7 +16954,7 @@
     </p:spTree>
     <p:extLst>
       <p:ext uri="{BB962C8B-B14F-4D97-AF65-F5344CB8AC3E}">
-        <p14:creationId xmlns:p14="http://schemas.microsoft.com/office/powerpoint/2010/main" val="291026785"/>
+        <p14:creationId xmlns:p14="http://schemas.microsoft.com/office/powerpoint/2010/main" val="1504814919"/>
       </p:ext>
     </p:extLst>
   </p:cSld>
@@ -16953,7 +16986,7 @@
           <p:cNvPr id="2" name="Title 1">
             <a:extLst>
               <a:ext uri="{FF2B5EF4-FFF2-40B4-BE49-F238E27FC236}">
-                <a16:creationId xmlns:a16="http://schemas.microsoft.com/office/drawing/2014/main" id="{55D23047-3833-EFE0-8A01-090ACFE1D9FC}"/>
+                <a16:creationId xmlns:a16="http://schemas.microsoft.com/office/drawing/2014/main" id="{69BCD6E1-D5BF-EF3E-F0CC-EDE7BAE35861}"/>
               </a:ext>
             </a:extLst>
           </p:cNvPr>
@@ -16973,42 +17006,99 @@
               <a:rPr lang="en-GB" b="1" i="0" u="none" strike="noStrike" baseline="0" dirty="0">
                 <a:latin typeface="Arial" panose="020B0604020202020204" pitchFamily="34" charset="0"/>
               </a:rPr>
-              <a:t>Tools</a:t>
-            </a:r>
-          </a:p>
-        </p:txBody>
-      </p:sp>
-      <p:sp>
-        <p:nvSpPr>
-          <p:cNvPr id="3" name="Text Placeholder 2">
-            <a:extLst>
-              <a:ext uri="{FF2B5EF4-FFF2-40B4-BE49-F238E27FC236}">
-                <a16:creationId xmlns:a16="http://schemas.microsoft.com/office/drawing/2014/main" id="{1F80B5F8-E4FB-9CDB-0C7C-EEDCB4B8AF1D}"/>
-              </a:ext>
-            </a:extLst>
-          </p:cNvPr>
-          <p:cNvSpPr>
-            <a:spLocks noGrp="1"/>
-          </p:cNvSpPr>
-          <p:nvPr>
-            <p:ph type="body" idx="1"/>
-          </p:nvPr>
-        </p:nvSpPr>
-        <p:spPr/>
-        <p:txBody>
-          <a:bodyPr/>
-          <a:lstStyle/>
-          <a:p>
-            <a:endParaRPr lang="en-SE"/>
-          </a:p>
-        </p:txBody>
-      </p:sp>
-      <p:sp>
-        <p:nvSpPr>
-          <p:cNvPr id="4" name="Footer Placeholder 3">
-            <a:extLst>
-              <a:ext uri="{FF2B5EF4-FFF2-40B4-BE49-F238E27FC236}">
-                <a16:creationId xmlns:a16="http://schemas.microsoft.com/office/drawing/2014/main" id="{AFF17C74-066C-F6D3-8B07-3A4273A5590B}"/>
+              <a:t>Script Flow</a:t>
+            </a:r>
+            <a:endParaRPr lang="en-SE" dirty="0"/>
+          </a:p>
+        </p:txBody>
+      </p:sp>
+      <p:sp>
+        <p:nvSpPr>
+          <p:cNvPr id="4" name="Text Placeholder 3">
+            <a:extLst>
+              <a:ext uri="{FF2B5EF4-FFF2-40B4-BE49-F238E27FC236}">
+                <a16:creationId xmlns:a16="http://schemas.microsoft.com/office/drawing/2014/main" id="{D7ABE405-4C8C-4761-DB98-41C6649D1B66}"/>
+              </a:ext>
+            </a:extLst>
+          </p:cNvPr>
+          <p:cNvSpPr>
+            <a:spLocks noGrp="1"/>
+          </p:cNvSpPr>
+          <p:nvPr>
+            <p:ph type="body" sz="half" idx="2"/>
+          </p:nvPr>
+        </p:nvSpPr>
+        <p:spPr>
+          <a:xfrm>
+            <a:off x="839788" y="2057400"/>
+            <a:ext cx="10877001" cy="3811588"/>
+          </a:xfrm>
+        </p:spPr>
+        <p:txBody>
+          <a:bodyPr>
+            <a:normAutofit/>
+          </a:bodyPr>
+          <a:lstStyle/>
+          <a:p>
+            <a:pPr marL="285750" indent="-285750">
+              <a:buFont typeface="Arial" panose="020B0604020202020204" pitchFamily="34" charset="0"/>
+              <a:buChar char="•"/>
+            </a:pPr>
+            <a:r>
+              <a:rPr lang="en-GB" sz="4400" b="0" i="0" u="none" strike="noStrike" baseline="0" dirty="0">
+                <a:latin typeface="Arial" panose="020B0604020202020204" pitchFamily="34" charset="0"/>
+              </a:rPr>
+              <a:t>Lab 8</a:t>
+            </a:r>
+          </a:p>
+          <a:p>
+            <a:pPr marL="285750" indent="-285750">
+              <a:buFont typeface="Arial" panose="020B0604020202020204" pitchFamily="34" charset="0"/>
+              <a:buChar char="•"/>
+            </a:pPr>
+            <a:endParaRPr lang="en-GB" sz="4400" b="0" i="0" u="none" strike="noStrike" baseline="0" dirty="0">
+              <a:latin typeface="Arial" panose="020B0604020202020204" pitchFamily="34" charset="0"/>
+            </a:endParaRPr>
+          </a:p>
+          <a:p>
+            <a:pPr marL="285750" indent="-285750">
+              <a:buFont typeface="Arial" panose="020B0604020202020204" pitchFamily="34" charset="0"/>
+              <a:buChar char="•"/>
+            </a:pPr>
+            <a:r>
+              <a:rPr lang="en-US" sz="1800" dirty="0">
+                <a:hlinkClick r:id="rId2"/>
+              </a:rPr>
+              <a:t>https://github.com/AdvaniaSE/PowerShellFundamentals</a:t>
+            </a:r>
+            <a:endParaRPr lang="en-US" sz="1800" dirty="0"/>
+          </a:p>
+          <a:p>
+            <a:pPr marL="742950" lvl="1" indent="-285750">
+              <a:buFont typeface="Arial" panose="020B0604020202020204" pitchFamily="34" charset="0"/>
+              <a:buChar char="•"/>
+            </a:pPr>
+            <a:r>
+              <a:rPr lang="en-US" dirty="0"/>
+              <a:t>08. Conditions &amp; Loops</a:t>
+            </a:r>
+            <a:endParaRPr lang="en-SE" dirty="0"/>
+          </a:p>
+          <a:p>
+            <a:pPr marL="285750" indent="-285750">
+              <a:buFont typeface="Arial" panose="020B0604020202020204" pitchFamily="34" charset="0"/>
+              <a:buChar char="•"/>
+            </a:pPr>
+            <a:endParaRPr lang="en-US" sz="1800" dirty="0"/>
+          </a:p>
+        </p:txBody>
+      </p:sp>
+      <p:sp>
+        <p:nvSpPr>
+          <p:cNvPr id="3" name="Footer Placeholder 2">
+            <a:extLst>
+              <a:ext uri="{FF2B5EF4-FFF2-40B4-BE49-F238E27FC236}">
+                <a16:creationId xmlns:a16="http://schemas.microsoft.com/office/drawing/2014/main" id="{1FAF7DB9-64B0-07FB-79A4-DC2D599FF636}"/>
               </a:ext>
             </a:extLst>
           </p:cNvPr>
@@ -17037,7 +17127,7 @@
           <p:cNvPr id="5" name="Slide Number Placeholder 4">
             <a:extLst>
               <a:ext uri="{FF2B5EF4-FFF2-40B4-BE49-F238E27FC236}">
-                <a16:creationId xmlns:a16="http://schemas.microsoft.com/office/drawing/2014/main" id="{20FE1399-C7F6-1C33-DF5B-DE42A78C5F7F}"/>
+                <a16:creationId xmlns:a16="http://schemas.microsoft.com/office/drawing/2014/main" id="{2C2623BC-FCDC-B4EF-82B9-EC9076C892AE}"/>
               </a:ext>
             </a:extLst>
           </p:cNvPr>
@@ -17064,7 +17154,7 @@
     </p:spTree>
     <p:extLst>
       <p:ext uri="{BB962C8B-B14F-4D97-AF65-F5344CB8AC3E}">
-        <p14:creationId xmlns:p14="http://schemas.microsoft.com/office/powerpoint/2010/main" val="3433697804"/>
+        <p14:creationId xmlns:p14="http://schemas.microsoft.com/office/powerpoint/2010/main" val="291026785"/>
       </p:ext>
     </p:extLst>
   </p:cSld>
@@ -17096,7 +17186,7 @@
           <p:cNvPr id="2" name="Title 1">
             <a:extLst>
               <a:ext uri="{FF2B5EF4-FFF2-40B4-BE49-F238E27FC236}">
-                <a16:creationId xmlns:a16="http://schemas.microsoft.com/office/drawing/2014/main" id="{020D5667-3F2E-0371-B2AF-410D252A6CEA}"/>
+                <a16:creationId xmlns:a16="http://schemas.microsoft.com/office/drawing/2014/main" id="{55D23047-3833-EFE0-8A01-090ACFE1D9FC}"/>
               </a:ext>
             </a:extLst>
           </p:cNvPr>
@@ -17107,26 +17197,17 @@
             <p:ph type="title"/>
           </p:nvPr>
         </p:nvSpPr>
-        <p:spPr>
-          <a:xfrm>
-            <a:off x="838200" y="365125"/>
-            <a:ext cx="10515600" cy="1325563"/>
-          </a:xfrm>
-        </p:spPr>
-        <p:txBody>
-          <a:bodyPr/>
-          <a:lstStyle/>
-          <a:p>
-            <a:pPr marR="0" rtl="0"/>
+        <p:spPr/>
+        <p:txBody>
+          <a:bodyPr/>
+          <a:lstStyle/>
+          <a:p>
             <a:r>
               <a:rPr lang="en-GB" b="1" i="0" u="none" strike="noStrike" baseline="0" dirty="0">
                 <a:latin typeface="Arial" panose="020B0604020202020204" pitchFamily="34" charset="0"/>
               </a:rPr>
               <a:t>Tools</a:t>
             </a:r>
-            <a:endParaRPr lang="en-GB" b="0" i="0" u="none" strike="noStrike" baseline="0" dirty="0">
-              <a:latin typeface="Arial" panose="020B0604020202020204" pitchFamily="34" charset="0"/>
-            </a:endParaRPr>
           </a:p>
         </p:txBody>
       </p:sp>
@@ -17135,7 +17216,7 @@
           <p:cNvPr id="3" name="Text Placeholder 2">
             <a:extLst>
               <a:ext uri="{FF2B5EF4-FFF2-40B4-BE49-F238E27FC236}">
-                <a16:creationId xmlns:a16="http://schemas.microsoft.com/office/drawing/2014/main" id="{14842F41-DE27-3397-05EB-81DCA4DF63A8}"/>
+                <a16:creationId xmlns:a16="http://schemas.microsoft.com/office/drawing/2014/main" id="{1F80B5F8-E4FB-9CDB-0C7C-EEDCB4B8AF1D}"/>
               </a:ext>
             </a:extLst>
           </p:cNvPr>
@@ -17148,209 +17229,10 @@
         </p:nvSpPr>
         <p:spPr/>
         <p:txBody>
-          <a:bodyPr>
-            <a:normAutofit/>
-          </a:bodyPr>
-          <a:lstStyle/>
-          <a:p>
-            <a:pPr marL="254000">
-              <a:lnSpc>
-                <a:spcPts val="1200"/>
-              </a:lnSpc>
-              <a:spcAft>
-                <a:spcPts val="800"/>
-              </a:spcAft>
-            </a:pPr>
-            <a:r>
-              <a:rPr lang="en-GB" sz="1800" kern="0" dirty="0">
-                <a:effectLst/>
-                <a:latin typeface="Arial" panose="020B0604020202020204" pitchFamily="34" charset="0"/>
-                <a:ea typeface="Times New Roman" panose="02020603050405020304" pitchFamily="18" charset="0"/>
-                <a:cs typeface="Times New Roman" panose="02020603050405020304" pitchFamily="18" charset="0"/>
-              </a:rPr>
-              <a:t>Editor</a:t>
-            </a:r>
-            <a:endParaRPr lang="en-SE" sz="1800" kern="100" dirty="0">
-              <a:effectLst/>
-              <a:latin typeface="Aptos" panose="020B0004020202020204" pitchFamily="34" charset="0"/>
-              <a:ea typeface="Times New Roman" panose="02020603050405020304" pitchFamily="18" charset="0"/>
-              <a:cs typeface="Times New Roman" panose="02020603050405020304" pitchFamily="18" charset="0"/>
-            </a:endParaRPr>
-          </a:p>
-          <a:p>
-            <a:pPr marL="381000">
-              <a:lnSpc>
-                <a:spcPts val="1200"/>
-              </a:lnSpc>
-              <a:spcAft>
-                <a:spcPts val="800"/>
-              </a:spcAft>
-            </a:pPr>
-            <a:r>
-              <a:rPr lang="en-GB" sz="1800" kern="0" dirty="0">
-                <a:effectLst/>
-                <a:latin typeface="Arial" panose="020B0604020202020204" pitchFamily="34" charset="0"/>
-                <a:ea typeface="Times New Roman" panose="02020603050405020304" pitchFamily="18" charset="0"/>
-                <a:cs typeface="Times New Roman" panose="02020603050405020304" pitchFamily="18" charset="0"/>
-              </a:rPr>
-              <a:t>ISE (Deprecated)</a:t>
-            </a:r>
-            <a:endParaRPr lang="en-SE" sz="1800" kern="100" dirty="0">
-              <a:effectLst/>
-              <a:latin typeface="Aptos" panose="020B0004020202020204" pitchFamily="34" charset="0"/>
-              <a:ea typeface="Times New Roman" panose="02020603050405020304" pitchFamily="18" charset="0"/>
-              <a:cs typeface="Times New Roman" panose="02020603050405020304" pitchFamily="18" charset="0"/>
-            </a:endParaRPr>
-          </a:p>
-          <a:p>
-            <a:pPr marL="381000">
-              <a:lnSpc>
-                <a:spcPts val="1200"/>
-              </a:lnSpc>
-              <a:spcAft>
-                <a:spcPts val="800"/>
-              </a:spcAft>
-            </a:pPr>
-            <a:r>
-              <a:rPr lang="en-GB" sz="1800" kern="0" dirty="0">
-                <a:effectLst/>
-                <a:latin typeface="Arial" panose="020B0604020202020204" pitchFamily="34" charset="0"/>
-                <a:ea typeface="Times New Roman" panose="02020603050405020304" pitchFamily="18" charset="0"/>
-                <a:cs typeface="Times New Roman" panose="02020603050405020304" pitchFamily="18" charset="0"/>
-              </a:rPr>
-              <a:t>VS Code</a:t>
-            </a:r>
-            <a:endParaRPr lang="en-SE" sz="1800" kern="100" dirty="0">
-              <a:effectLst/>
-              <a:latin typeface="Aptos" panose="020B0004020202020204" pitchFamily="34" charset="0"/>
-              <a:ea typeface="Times New Roman" panose="02020603050405020304" pitchFamily="18" charset="0"/>
-              <a:cs typeface="Times New Roman" panose="02020603050405020304" pitchFamily="18" charset="0"/>
-            </a:endParaRPr>
-          </a:p>
-          <a:p>
-            <a:pPr marL="508000">
-              <a:lnSpc>
-                <a:spcPts val="1200"/>
-              </a:lnSpc>
-              <a:spcAft>
-                <a:spcPts val="800"/>
-              </a:spcAft>
-            </a:pPr>
-            <a:r>
-              <a:rPr lang="en-GB" sz="1800" kern="0" dirty="0">
-                <a:effectLst/>
-                <a:latin typeface="Arial" panose="020B0604020202020204" pitchFamily="34" charset="0"/>
-                <a:ea typeface="Times New Roman" panose="02020603050405020304" pitchFamily="18" charset="0"/>
-                <a:cs typeface="Times New Roman" panose="02020603050405020304" pitchFamily="18" charset="0"/>
-              </a:rPr>
-              <a:t>Workspace</a:t>
-            </a:r>
-            <a:endParaRPr lang="en-SE" sz="1800" kern="100" dirty="0">
-              <a:effectLst/>
-              <a:latin typeface="Aptos" panose="020B0004020202020204" pitchFamily="34" charset="0"/>
-              <a:ea typeface="Times New Roman" panose="02020603050405020304" pitchFamily="18" charset="0"/>
-              <a:cs typeface="Times New Roman" panose="02020603050405020304" pitchFamily="18" charset="0"/>
-            </a:endParaRPr>
-          </a:p>
-          <a:p>
-            <a:pPr marL="508000">
-              <a:lnSpc>
-                <a:spcPts val="1200"/>
-              </a:lnSpc>
-              <a:spcAft>
-                <a:spcPts val="800"/>
-              </a:spcAft>
-            </a:pPr>
-            <a:r>
-              <a:rPr lang="en-GB" sz="1800" kern="0" dirty="0">
-                <a:effectLst/>
-                <a:latin typeface="Arial" panose="020B0604020202020204" pitchFamily="34" charset="0"/>
-                <a:ea typeface="Times New Roman" panose="02020603050405020304" pitchFamily="18" charset="0"/>
-                <a:cs typeface="Times New Roman" panose="02020603050405020304" pitchFamily="18" charset="0"/>
-              </a:rPr>
-              <a:t>Create Scripts</a:t>
-            </a:r>
-            <a:endParaRPr lang="en-SE" sz="1800" kern="100" dirty="0">
-              <a:effectLst/>
-              <a:latin typeface="Aptos" panose="020B0004020202020204" pitchFamily="34" charset="0"/>
-              <a:ea typeface="Times New Roman" panose="02020603050405020304" pitchFamily="18" charset="0"/>
-              <a:cs typeface="Times New Roman" panose="02020603050405020304" pitchFamily="18" charset="0"/>
-            </a:endParaRPr>
-          </a:p>
-          <a:p>
-            <a:pPr marL="508000">
-              <a:lnSpc>
-                <a:spcPts val="1200"/>
-              </a:lnSpc>
-              <a:spcAft>
-                <a:spcPts val="800"/>
-              </a:spcAft>
-            </a:pPr>
-            <a:r>
-              <a:rPr lang="en-GB" sz="1800" kern="0" dirty="0">
-                <a:effectLst/>
-                <a:latin typeface="Arial" panose="020B0604020202020204" pitchFamily="34" charset="0"/>
-                <a:ea typeface="Times New Roman" panose="02020603050405020304" pitchFamily="18" charset="0"/>
-                <a:cs typeface="Times New Roman" panose="02020603050405020304" pitchFamily="18" charset="0"/>
-              </a:rPr>
-              <a:t>Move Line</a:t>
-            </a:r>
-            <a:endParaRPr lang="en-SE" sz="1800" kern="100" dirty="0">
-              <a:effectLst/>
-              <a:latin typeface="Aptos" panose="020B0004020202020204" pitchFamily="34" charset="0"/>
-              <a:ea typeface="Times New Roman" panose="02020603050405020304" pitchFamily="18" charset="0"/>
-              <a:cs typeface="Times New Roman" panose="02020603050405020304" pitchFamily="18" charset="0"/>
-            </a:endParaRPr>
-          </a:p>
-          <a:p>
-            <a:pPr marL="508000">
-              <a:lnSpc>
-                <a:spcPts val="1200"/>
-              </a:lnSpc>
-              <a:spcAft>
-                <a:spcPts val="800"/>
-              </a:spcAft>
-            </a:pPr>
-            <a:r>
-              <a:rPr lang="en-GB" sz="1800" kern="0" dirty="0">
-                <a:effectLst/>
-                <a:latin typeface="Arial" panose="020B0604020202020204" pitchFamily="34" charset="0"/>
-                <a:ea typeface="Times New Roman" panose="02020603050405020304" pitchFamily="18" charset="0"/>
-                <a:cs typeface="Times New Roman" panose="02020603050405020304" pitchFamily="18" charset="0"/>
-              </a:rPr>
-              <a:t>Change All Occurrences</a:t>
-            </a:r>
-            <a:endParaRPr lang="en-SE" sz="1800" kern="100" dirty="0">
-              <a:effectLst/>
-              <a:latin typeface="Aptos" panose="020B0004020202020204" pitchFamily="34" charset="0"/>
-              <a:ea typeface="Times New Roman" panose="02020603050405020304" pitchFamily="18" charset="0"/>
-              <a:cs typeface="Times New Roman" panose="02020603050405020304" pitchFamily="18" charset="0"/>
-            </a:endParaRPr>
-          </a:p>
-          <a:p>
-            <a:pPr marL="508000">
-              <a:lnSpc>
-                <a:spcPts val="1200"/>
-              </a:lnSpc>
-              <a:spcAft>
-                <a:spcPts val="800"/>
-              </a:spcAft>
-            </a:pPr>
-            <a:r>
-              <a:rPr lang="en-GB" sz="1800" kern="0" dirty="0">
-                <a:effectLst/>
-                <a:latin typeface="Arial" panose="020B0604020202020204" pitchFamily="34" charset="0"/>
-                <a:ea typeface="Times New Roman" panose="02020603050405020304" pitchFamily="18" charset="0"/>
-                <a:cs typeface="Times New Roman" panose="02020603050405020304" pitchFamily="18" charset="0"/>
-              </a:rPr>
-              <a:t>Format Document</a:t>
-            </a:r>
-            <a:endParaRPr lang="en-SE" sz="1800" kern="100" dirty="0">
-              <a:effectLst/>
-              <a:latin typeface="Aptos" panose="020B0004020202020204" pitchFamily="34" charset="0"/>
-              <a:ea typeface="Times New Roman" panose="02020603050405020304" pitchFamily="18" charset="0"/>
-              <a:cs typeface="Times New Roman" panose="02020603050405020304" pitchFamily="18" charset="0"/>
-            </a:endParaRPr>
+          <a:bodyPr/>
+          <a:lstStyle/>
+          <a:p>
+            <a:endParaRPr lang="en-SE"/>
           </a:p>
         </p:txBody>
       </p:sp>
@@ -17359,7 +17241,7 @@
           <p:cNvPr id="4" name="Footer Placeholder 3">
             <a:extLst>
               <a:ext uri="{FF2B5EF4-FFF2-40B4-BE49-F238E27FC236}">
-                <a16:creationId xmlns:a16="http://schemas.microsoft.com/office/drawing/2014/main" id="{DFC4B1A9-C5E5-6767-5A67-3AFFF61F8AE3}"/>
+                <a16:creationId xmlns:a16="http://schemas.microsoft.com/office/drawing/2014/main" id="{AFF17C74-066C-F6D3-8B07-3A4273A5590B}"/>
               </a:ext>
             </a:extLst>
           </p:cNvPr>
@@ -17388,7 +17270,7 @@
           <p:cNvPr id="5" name="Slide Number Placeholder 4">
             <a:extLst>
               <a:ext uri="{FF2B5EF4-FFF2-40B4-BE49-F238E27FC236}">
-                <a16:creationId xmlns:a16="http://schemas.microsoft.com/office/drawing/2014/main" id="{BAD258B7-9534-6ABE-261E-70D2894B8FD8}"/>
+                <a16:creationId xmlns:a16="http://schemas.microsoft.com/office/drawing/2014/main" id="{20FE1399-C7F6-1C33-DF5B-DE42A78C5F7F}"/>
               </a:ext>
             </a:extLst>
           </p:cNvPr>
@@ -17404,7 +17286,7 @@
           <a:bodyPr/>
           <a:lstStyle/>
           <a:p>
-            <a:fld id="{9993A830-6DA6-4394-A358-10250CDB3A67}" type="slidenum">
+            <a:fld id="{BFEA1545-8540-491B-83AB-51C306516EA6}" type="slidenum">
               <a:rPr lang="en-SE" smtClean="0"/>
               <a:t>64</a:t>
             </a:fld>
@@ -17415,7 +17297,7 @@
     </p:spTree>
     <p:extLst>
       <p:ext uri="{BB962C8B-B14F-4D97-AF65-F5344CB8AC3E}">
-        <p14:creationId xmlns:p14="http://schemas.microsoft.com/office/powerpoint/2010/main" val="1470052913"/>
+        <p14:creationId xmlns:p14="http://schemas.microsoft.com/office/powerpoint/2010/main" val="3433697804"/>
       </p:ext>
     </p:extLst>
   </p:cSld>
@@ -17513,13 +17395,13 @@
               </a:spcAft>
             </a:pPr>
             <a:r>
-              <a:rPr lang="en-GB" sz="1800" kern="0" dirty="0" err="1">
+              <a:rPr lang="en-GB" sz="1800" kern="0" dirty="0">
                 <a:effectLst/>
                 <a:latin typeface="Arial" panose="020B0604020202020204" pitchFamily="34" charset="0"/>
                 <a:ea typeface="Times New Roman" panose="02020603050405020304" pitchFamily="18" charset="0"/>
                 <a:cs typeface="Times New Roman" panose="02020603050405020304" pitchFamily="18" charset="0"/>
               </a:rPr>
-              <a:t>PSGallery</a:t>
+              <a:t>Editor</a:t>
             </a:r>
             <a:endParaRPr lang="en-SE" sz="1800" kern="100" dirty="0">
               <a:effectLst/>
@@ -17529,7 +17411,7 @@
             </a:endParaRPr>
           </a:p>
           <a:p>
-            <a:pPr marL="254000">
+            <a:pPr marL="381000">
               <a:lnSpc>
                 <a:spcPts val="1200"/>
               </a:lnSpc>
@@ -17544,7 +17426,7 @@
                 <a:ea typeface="Times New Roman" panose="02020603050405020304" pitchFamily="18" charset="0"/>
                 <a:cs typeface="Times New Roman" panose="02020603050405020304" pitchFamily="18" charset="0"/>
               </a:rPr>
-              <a:t>Windows Terminal</a:t>
+              <a:t>ISE (Deprecated)</a:t>
             </a:r>
             <a:endParaRPr lang="en-SE" sz="1800" kern="100" dirty="0">
               <a:effectLst/>
@@ -17553,6 +17435,156 @@
               <a:cs typeface="Times New Roman" panose="02020603050405020304" pitchFamily="18" charset="0"/>
             </a:endParaRPr>
           </a:p>
+          <a:p>
+            <a:pPr marL="381000">
+              <a:lnSpc>
+                <a:spcPts val="1200"/>
+              </a:lnSpc>
+              <a:spcAft>
+                <a:spcPts val="800"/>
+              </a:spcAft>
+            </a:pPr>
+            <a:r>
+              <a:rPr lang="en-GB" sz="1800" kern="0" dirty="0">
+                <a:effectLst/>
+                <a:latin typeface="Arial" panose="020B0604020202020204" pitchFamily="34" charset="0"/>
+                <a:ea typeface="Times New Roman" panose="02020603050405020304" pitchFamily="18" charset="0"/>
+                <a:cs typeface="Times New Roman" panose="02020603050405020304" pitchFamily="18" charset="0"/>
+              </a:rPr>
+              <a:t>VS Code</a:t>
+            </a:r>
+            <a:endParaRPr lang="en-SE" sz="1800" kern="100" dirty="0">
+              <a:effectLst/>
+              <a:latin typeface="Aptos" panose="020B0004020202020204" pitchFamily="34" charset="0"/>
+              <a:ea typeface="Times New Roman" panose="02020603050405020304" pitchFamily="18" charset="0"/>
+              <a:cs typeface="Times New Roman" panose="02020603050405020304" pitchFamily="18" charset="0"/>
+            </a:endParaRPr>
+          </a:p>
+          <a:p>
+            <a:pPr marL="508000">
+              <a:lnSpc>
+                <a:spcPts val="1200"/>
+              </a:lnSpc>
+              <a:spcAft>
+                <a:spcPts val="800"/>
+              </a:spcAft>
+            </a:pPr>
+            <a:r>
+              <a:rPr lang="en-GB" sz="1800" kern="0" dirty="0">
+                <a:effectLst/>
+                <a:latin typeface="Arial" panose="020B0604020202020204" pitchFamily="34" charset="0"/>
+                <a:ea typeface="Times New Roman" panose="02020603050405020304" pitchFamily="18" charset="0"/>
+                <a:cs typeface="Times New Roman" panose="02020603050405020304" pitchFamily="18" charset="0"/>
+              </a:rPr>
+              <a:t>Workspace</a:t>
+            </a:r>
+            <a:endParaRPr lang="en-SE" sz="1800" kern="100" dirty="0">
+              <a:effectLst/>
+              <a:latin typeface="Aptos" panose="020B0004020202020204" pitchFamily="34" charset="0"/>
+              <a:ea typeface="Times New Roman" panose="02020603050405020304" pitchFamily="18" charset="0"/>
+              <a:cs typeface="Times New Roman" panose="02020603050405020304" pitchFamily="18" charset="0"/>
+            </a:endParaRPr>
+          </a:p>
+          <a:p>
+            <a:pPr marL="508000">
+              <a:lnSpc>
+                <a:spcPts val="1200"/>
+              </a:lnSpc>
+              <a:spcAft>
+                <a:spcPts val="800"/>
+              </a:spcAft>
+            </a:pPr>
+            <a:r>
+              <a:rPr lang="en-GB" sz="1800" kern="0" dirty="0">
+                <a:effectLst/>
+                <a:latin typeface="Arial" panose="020B0604020202020204" pitchFamily="34" charset="0"/>
+                <a:ea typeface="Times New Roman" panose="02020603050405020304" pitchFamily="18" charset="0"/>
+                <a:cs typeface="Times New Roman" panose="02020603050405020304" pitchFamily="18" charset="0"/>
+              </a:rPr>
+              <a:t>Create Scripts</a:t>
+            </a:r>
+            <a:endParaRPr lang="en-SE" sz="1800" kern="100" dirty="0">
+              <a:effectLst/>
+              <a:latin typeface="Aptos" panose="020B0004020202020204" pitchFamily="34" charset="0"/>
+              <a:ea typeface="Times New Roman" panose="02020603050405020304" pitchFamily="18" charset="0"/>
+              <a:cs typeface="Times New Roman" panose="02020603050405020304" pitchFamily="18" charset="0"/>
+            </a:endParaRPr>
+          </a:p>
+          <a:p>
+            <a:pPr marL="508000">
+              <a:lnSpc>
+                <a:spcPts val="1200"/>
+              </a:lnSpc>
+              <a:spcAft>
+                <a:spcPts val="800"/>
+              </a:spcAft>
+            </a:pPr>
+            <a:r>
+              <a:rPr lang="en-GB" sz="1800" kern="0" dirty="0">
+                <a:effectLst/>
+                <a:latin typeface="Arial" panose="020B0604020202020204" pitchFamily="34" charset="0"/>
+                <a:ea typeface="Times New Roman" panose="02020603050405020304" pitchFamily="18" charset="0"/>
+                <a:cs typeface="Times New Roman" panose="02020603050405020304" pitchFamily="18" charset="0"/>
+              </a:rPr>
+              <a:t>Move Line</a:t>
+            </a:r>
+            <a:endParaRPr lang="en-SE" sz="1800" kern="100" dirty="0">
+              <a:effectLst/>
+              <a:latin typeface="Aptos" panose="020B0004020202020204" pitchFamily="34" charset="0"/>
+              <a:ea typeface="Times New Roman" panose="02020603050405020304" pitchFamily="18" charset="0"/>
+              <a:cs typeface="Times New Roman" panose="02020603050405020304" pitchFamily="18" charset="0"/>
+            </a:endParaRPr>
+          </a:p>
+          <a:p>
+            <a:pPr marL="508000">
+              <a:lnSpc>
+                <a:spcPts val="1200"/>
+              </a:lnSpc>
+              <a:spcAft>
+                <a:spcPts val="800"/>
+              </a:spcAft>
+            </a:pPr>
+            <a:r>
+              <a:rPr lang="en-GB" sz="1800" kern="0" dirty="0">
+                <a:effectLst/>
+                <a:latin typeface="Arial" panose="020B0604020202020204" pitchFamily="34" charset="0"/>
+                <a:ea typeface="Times New Roman" panose="02020603050405020304" pitchFamily="18" charset="0"/>
+                <a:cs typeface="Times New Roman" panose="02020603050405020304" pitchFamily="18" charset="0"/>
+              </a:rPr>
+              <a:t>Change All Occurrences</a:t>
+            </a:r>
+            <a:endParaRPr lang="en-SE" sz="1800" kern="100" dirty="0">
+              <a:effectLst/>
+              <a:latin typeface="Aptos" panose="020B0004020202020204" pitchFamily="34" charset="0"/>
+              <a:ea typeface="Times New Roman" panose="02020603050405020304" pitchFamily="18" charset="0"/>
+              <a:cs typeface="Times New Roman" panose="02020603050405020304" pitchFamily="18" charset="0"/>
+            </a:endParaRPr>
+          </a:p>
+          <a:p>
+            <a:pPr marL="508000">
+              <a:lnSpc>
+                <a:spcPts val="1200"/>
+              </a:lnSpc>
+              <a:spcAft>
+                <a:spcPts val="800"/>
+              </a:spcAft>
+            </a:pPr>
+            <a:r>
+              <a:rPr lang="en-GB" sz="1800" kern="0" dirty="0">
+                <a:effectLst/>
+                <a:latin typeface="Arial" panose="020B0604020202020204" pitchFamily="34" charset="0"/>
+                <a:ea typeface="Times New Roman" panose="02020603050405020304" pitchFamily="18" charset="0"/>
+                <a:cs typeface="Times New Roman" panose="02020603050405020304" pitchFamily="18" charset="0"/>
+              </a:rPr>
+              <a:t>Format Document</a:t>
+            </a:r>
+            <a:endParaRPr lang="en-SE" sz="1800" kern="100" dirty="0">
+              <a:effectLst/>
+              <a:latin typeface="Aptos" panose="020B0004020202020204" pitchFamily="34" charset="0"/>
+              <a:ea typeface="Times New Roman" panose="02020603050405020304" pitchFamily="18" charset="0"/>
+              <a:cs typeface="Times New Roman" panose="02020603050405020304" pitchFamily="18" charset="0"/>
+            </a:endParaRPr>
+          </a:p>
         </p:txBody>
       </p:sp>
       <p:sp>
@@ -17616,7 +17648,7 @@
     </p:spTree>
     <p:extLst>
       <p:ext uri="{BB962C8B-B14F-4D97-AF65-F5344CB8AC3E}">
-        <p14:creationId xmlns:p14="http://schemas.microsoft.com/office/powerpoint/2010/main" val="4283221755"/>
+        <p14:creationId xmlns:p14="http://schemas.microsoft.com/office/powerpoint/2010/main" val="1470052913"/>
       </p:ext>
     </p:extLst>
   </p:cSld>
@@ -17714,40 +17746,20 @@
               </a:spcAft>
             </a:pPr>
             <a:r>
-              <a:rPr lang="en-US" sz="1800" kern="100" dirty="0">
+              <a:rPr lang="en-GB" sz="1800" kern="0" dirty="0" err="1">
                 <a:effectLst/>
-                <a:latin typeface="Aptos" panose="020B0004020202020204" pitchFamily="34" charset="0"/>
+                <a:latin typeface="Arial" panose="020B0604020202020204" pitchFamily="34" charset="0"/>
                 <a:ea typeface="Times New Roman" panose="02020603050405020304" pitchFamily="18" charset="0"/>
                 <a:cs typeface="Times New Roman" panose="02020603050405020304" pitchFamily="18" charset="0"/>
-                <a:hlinkClick r:id="rId2"/>
-              </a:rPr>
-              <a:t>PowerShell Documentation</a:t>
-            </a:r>
-            <a:endParaRPr lang="en-US" sz="1800" kern="100" dirty="0">
+              </a:rPr>
+              <a:t>PSGallery</a:t>
+            </a:r>
+            <a:endParaRPr lang="en-SE" sz="1800" kern="100" dirty="0">
               <a:effectLst/>
               <a:latin typeface="Aptos" panose="020B0004020202020204" pitchFamily="34" charset="0"/>
               <a:ea typeface="Times New Roman" panose="02020603050405020304" pitchFamily="18" charset="0"/>
               <a:cs typeface="Times New Roman" panose="02020603050405020304" pitchFamily="18" charset="0"/>
             </a:endParaRPr>
-          </a:p>
-          <a:p>
-            <a:pPr marL="711200" lvl="1">
-              <a:lnSpc>
-                <a:spcPts val="1200"/>
-              </a:lnSpc>
-              <a:spcAft>
-                <a:spcPts val="800"/>
-              </a:spcAft>
-            </a:pPr>
-            <a:r>
-              <a:rPr lang="en-US" sz="1400" kern="100" dirty="0">
-                <a:effectLst/>
-                <a:latin typeface="Aptos" panose="020B0004020202020204" pitchFamily="34" charset="0"/>
-                <a:ea typeface="Times New Roman" panose="02020603050405020304" pitchFamily="18" charset="0"/>
-                <a:cs typeface="Times New Roman" panose="02020603050405020304" pitchFamily="18" charset="0"/>
-              </a:rPr>
-              <a:t>https://learn.microsoft.com/en-us/powershell/</a:t>
-            </a:r>
           </a:p>
           <a:p>
             <a:pPr marL="254000">
@@ -17759,182 +17771,21 @@
               </a:spcAft>
             </a:pPr>
             <a:r>
-              <a:rPr lang="en-US" sz="1800" kern="100" dirty="0">
+              <a:rPr lang="en-GB" sz="1800" kern="0" dirty="0">
                 <a:effectLst/>
-                <a:latin typeface="Aptos" panose="020B0004020202020204" pitchFamily="34" charset="0"/>
+                <a:latin typeface="Arial" panose="020B0604020202020204" pitchFamily="34" charset="0"/>
                 <a:ea typeface="Times New Roman" panose="02020603050405020304" pitchFamily="18" charset="0"/>
                 <a:cs typeface="Times New Roman" panose="02020603050405020304" pitchFamily="18" charset="0"/>
-                <a:hlinkClick r:id="rId3"/>
-              </a:rPr>
-              <a:t>PSKoans</a:t>
-            </a:r>
-            <a:endParaRPr lang="en-US" sz="1800" kern="100" dirty="0">
+              </a:rPr>
+              <a:t>Windows Terminal</a:t>
+            </a:r>
+            <a:endParaRPr lang="en-SE" sz="1800" kern="100" dirty="0">
               <a:effectLst/>
               <a:latin typeface="Aptos" panose="020B0004020202020204" pitchFamily="34" charset="0"/>
               <a:ea typeface="Times New Roman" panose="02020603050405020304" pitchFamily="18" charset="0"/>
               <a:cs typeface="Times New Roman" panose="02020603050405020304" pitchFamily="18" charset="0"/>
             </a:endParaRPr>
           </a:p>
-          <a:p>
-            <a:pPr marL="711200" lvl="1">
-              <a:lnSpc>
-                <a:spcPts val="1200"/>
-              </a:lnSpc>
-              <a:spcAft>
-                <a:spcPts val="800"/>
-              </a:spcAft>
-            </a:pPr>
-            <a:r>
-              <a:rPr lang="en-US" sz="1400" kern="100" dirty="0">
-                <a:effectLst/>
-                <a:latin typeface="Aptos" panose="020B0004020202020204" pitchFamily="34" charset="0"/>
-                <a:ea typeface="Times New Roman" panose="02020603050405020304" pitchFamily="18" charset="0"/>
-                <a:cs typeface="Times New Roman" panose="02020603050405020304" pitchFamily="18" charset="0"/>
-              </a:rPr>
-              <a:t>https://github.com/vexx32/PSKoans</a:t>
-            </a:r>
-          </a:p>
-          <a:p>
-            <a:pPr marL="254000">
-              <a:lnSpc>
-                <a:spcPts val="1200"/>
-              </a:lnSpc>
-              <a:spcAft>
-                <a:spcPts val="800"/>
-              </a:spcAft>
-            </a:pPr>
-            <a:r>
-              <a:rPr lang="en-US" sz="1800" kern="100" dirty="0">
-                <a:effectLst/>
-                <a:latin typeface="Aptos" panose="020B0004020202020204" pitchFamily="34" charset="0"/>
-                <a:ea typeface="Times New Roman" panose="02020603050405020304" pitchFamily="18" charset="0"/>
-                <a:cs typeface="Times New Roman" panose="02020603050405020304" pitchFamily="18" charset="0"/>
-                <a:hlinkClick r:id="rId4"/>
-              </a:rPr>
-              <a:t>Community Best Practices</a:t>
-            </a:r>
-            <a:endParaRPr lang="en-US" sz="1800" kern="100" dirty="0">
-              <a:effectLst/>
-              <a:latin typeface="Aptos" panose="020B0004020202020204" pitchFamily="34" charset="0"/>
-              <a:ea typeface="Times New Roman" panose="02020603050405020304" pitchFamily="18" charset="0"/>
-              <a:cs typeface="Times New Roman" panose="02020603050405020304" pitchFamily="18" charset="0"/>
-            </a:endParaRPr>
-          </a:p>
-          <a:p>
-            <a:pPr marL="711200" lvl="1">
-              <a:lnSpc>
-                <a:spcPts val="1200"/>
-              </a:lnSpc>
-              <a:spcAft>
-                <a:spcPts val="800"/>
-              </a:spcAft>
-            </a:pPr>
-            <a:r>
-              <a:rPr lang="en-US" sz="1400" kern="100" dirty="0">
-                <a:effectLst/>
-                <a:latin typeface="Aptos" panose="020B0004020202020204" pitchFamily="34" charset="0"/>
-                <a:ea typeface="Times New Roman" panose="02020603050405020304" pitchFamily="18" charset="0"/>
-                <a:cs typeface="Times New Roman" panose="02020603050405020304" pitchFamily="18" charset="0"/>
-              </a:rPr>
-              <a:t>https://github.com/PoshCode/PowerShellPracticeAndStyle</a:t>
-            </a:r>
-          </a:p>
-          <a:p>
-            <a:pPr marL="254000">
-              <a:lnSpc>
-                <a:spcPts val="1200"/>
-              </a:lnSpc>
-              <a:spcAft>
-                <a:spcPts val="800"/>
-              </a:spcAft>
-            </a:pPr>
-            <a:r>
-              <a:rPr lang="en-US" sz="1800" kern="100" dirty="0">
-                <a:effectLst/>
-                <a:latin typeface="Aptos" panose="020B0004020202020204" pitchFamily="34" charset="0"/>
-                <a:ea typeface="Times New Roman" panose="02020603050405020304" pitchFamily="18" charset="0"/>
-                <a:cs typeface="Times New Roman" panose="02020603050405020304" pitchFamily="18" charset="0"/>
-                <a:hlinkClick r:id="rId5"/>
-              </a:rPr>
-              <a:t>Learn PowerShell in a Month of Lunches,  4:th Edition</a:t>
-            </a:r>
-            <a:endParaRPr lang="en-US" sz="1800" kern="100" dirty="0">
-              <a:effectLst/>
-              <a:latin typeface="Aptos" panose="020B0004020202020204" pitchFamily="34" charset="0"/>
-              <a:ea typeface="Times New Roman" panose="02020603050405020304" pitchFamily="18" charset="0"/>
-              <a:cs typeface="Times New Roman" panose="02020603050405020304" pitchFamily="18" charset="0"/>
-            </a:endParaRPr>
-          </a:p>
-          <a:p>
-            <a:pPr marL="711200" lvl="1">
-              <a:lnSpc>
-                <a:spcPts val="1200"/>
-              </a:lnSpc>
-              <a:spcAft>
-                <a:spcPts val="800"/>
-              </a:spcAft>
-            </a:pPr>
-            <a:r>
-              <a:rPr lang="en-US" sz="1400" kern="100" dirty="0">
-                <a:effectLst/>
-                <a:latin typeface="Aptos" panose="020B0004020202020204" pitchFamily="34" charset="0"/>
-                <a:ea typeface="Times New Roman" panose="02020603050405020304" pitchFamily="18" charset="0"/>
-                <a:cs typeface="Times New Roman" panose="02020603050405020304" pitchFamily="18" charset="0"/>
-              </a:rPr>
-              <a:t>https://www.manning.com/books/learn-powershell-in-a-month-of-lunches</a:t>
-            </a:r>
-            <a:endParaRPr lang="en-US" sz="1800" kern="100" dirty="0">
-              <a:effectLst/>
-              <a:latin typeface="Aptos" panose="020B0004020202020204" pitchFamily="34" charset="0"/>
-              <a:ea typeface="Times New Roman" panose="02020603050405020304" pitchFamily="18" charset="0"/>
-              <a:cs typeface="Times New Roman" panose="02020603050405020304" pitchFamily="18" charset="0"/>
-            </a:endParaRPr>
-          </a:p>
-          <a:p>
-            <a:pPr marL="254000">
-              <a:lnSpc>
-                <a:spcPts val="1200"/>
-              </a:lnSpc>
-              <a:spcAft>
-                <a:spcPts val="800"/>
-              </a:spcAft>
-            </a:pPr>
-            <a:r>
-              <a:rPr lang="en-US" sz="1800" kern="100" dirty="0">
-                <a:effectLst/>
-                <a:latin typeface="Aptos" panose="020B0004020202020204" pitchFamily="34" charset="0"/>
-                <a:ea typeface="Times New Roman" panose="02020603050405020304" pitchFamily="18" charset="0"/>
-                <a:cs typeface="Times New Roman" panose="02020603050405020304" pitchFamily="18" charset="0"/>
-                <a:hlinkClick r:id="rId6"/>
-              </a:rPr>
-              <a:t>Automate administrative tasks by using PowerShell – Learn</a:t>
-            </a:r>
-            <a:endParaRPr lang="en-US" sz="1800" kern="100" dirty="0">
-              <a:effectLst/>
-              <a:latin typeface="Aptos" panose="020B0004020202020204" pitchFamily="34" charset="0"/>
-              <a:ea typeface="Times New Roman" panose="02020603050405020304" pitchFamily="18" charset="0"/>
-              <a:cs typeface="Times New Roman" panose="02020603050405020304" pitchFamily="18" charset="0"/>
-            </a:endParaRPr>
-          </a:p>
-          <a:p>
-            <a:pPr marL="711200" lvl="1">
-              <a:lnSpc>
-                <a:spcPts val="1200"/>
-              </a:lnSpc>
-              <a:spcAft>
-                <a:spcPts val="800"/>
-              </a:spcAft>
-            </a:pPr>
-            <a:r>
-              <a:rPr lang="en-US" sz="1400" kern="100" dirty="0">
-                <a:effectLst/>
-                <a:latin typeface="Aptos" panose="020B0004020202020204" pitchFamily="34" charset="0"/>
-                <a:ea typeface="Times New Roman" panose="02020603050405020304" pitchFamily="18" charset="0"/>
-                <a:cs typeface="Times New Roman" panose="02020603050405020304" pitchFamily="18" charset="0"/>
-              </a:rPr>
-              <a:t>https://learn.microsoft.com/en-us/training/paths/powershell/</a:t>
-            </a:r>
-          </a:p>
         </p:txBody>
       </p:sp>
       <p:sp>
@@ -17998,7 +17849,7 @@
     </p:spTree>
     <p:extLst>
       <p:ext uri="{BB962C8B-B14F-4D97-AF65-F5344CB8AC3E}">
-        <p14:creationId xmlns:p14="http://schemas.microsoft.com/office/powerpoint/2010/main" val="2832576292"/>
+        <p14:creationId xmlns:p14="http://schemas.microsoft.com/office/powerpoint/2010/main" val="4283221755"/>
       </p:ext>
     </p:extLst>
   </p:cSld>
@@ -18030,7 +17881,7 @@
           <p:cNvPr id="2" name="Title 1">
             <a:extLst>
               <a:ext uri="{FF2B5EF4-FFF2-40B4-BE49-F238E27FC236}">
-                <a16:creationId xmlns:a16="http://schemas.microsoft.com/office/drawing/2014/main" id="{55D23047-3833-EFE0-8A01-090ACFE1D9FC}"/>
+                <a16:creationId xmlns:a16="http://schemas.microsoft.com/office/drawing/2014/main" id="{020D5667-3F2E-0371-B2AF-410D252A6CEA}"/>
               </a:ext>
             </a:extLst>
           </p:cNvPr>
@@ -18041,18 +17892,26 @@
             <p:ph type="title"/>
           </p:nvPr>
         </p:nvSpPr>
-        <p:spPr/>
-        <p:txBody>
-          <a:bodyPr/>
-          <a:lstStyle/>
-          <a:p>
+        <p:spPr>
+          <a:xfrm>
+            <a:off x="838200" y="365125"/>
+            <a:ext cx="10515600" cy="1325563"/>
+          </a:xfrm>
+        </p:spPr>
+        <p:txBody>
+          <a:bodyPr/>
+          <a:lstStyle/>
+          <a:p>
+            <a:pPr marR="0" rtl="0"/>
             <a:r>
               <a:rPr lang="en-GB" b="1" i="0" u="none" strike="noStrike" baseline="0" dirty="0">
                 <a:latin typeface="Arial" panose="020B0604020202020204" pitchFamily="34" charset="0"/>
               </a:rPr>
-              <a:t>Version Control</a:t>
-            </a:r>
-            <a:endParaRPr lang="en-SE" dirty="0"/>
+              <a:t>Tools</a:t>
+            </a:r>
+            <a:endParaRPr lang="en-GB" b="0" i="0" u="none" strike="noStrike" baseline="0" dirty="0">
+              <a:latin typeface="Arial" panose="020B0604020202020204" pitchFamily="34" charset="0"/>
+            </a:endParaRPr>
           </a:p>
         </p:txBody>
       </p:sp>
@@ -18061,7 +17920,7 @@
           <p:cNvPr id="3" name="Text Placeholder 2">
             <a:extLst>
               <a:ext uri="{FF2B5EF4-FFF2-40B4-BE49-F238E27FC236}">
-                <a16:creationId xmlns:a16="http://schemas.microsoft.com/office/drawing/2014/main" id="{1F80B5F8-E4FB-9CDB-0C7C-EEDCB4B8AF1D}"/>
+                <a16:creationId xmlns:a16="http://schemas.microsoft.com/office/drawing/2014/main" id="{14842F41-DE27-3397-05EB-81DCA4DF63A8}"/>
               </a:ext>
             </a:extLst>
           </p:cNvPr>
@@ -18074,10 +17933,240 @@
         </p:nvSpPr>
         <p:spPr/>
         <p:txBody>
-          <a:bodyPr/>
-          <a:lstStyle/>
-          <a:p>
-            <a:endParaRPr lang="en-SE"/>
+          <a:bodyPr>
+            <a:normAutofit/>
+          </a:bodyPr>
+          <a:lstStyle/>
+          <a:p>
+            <a:pPr marL="254000">
+              <a:lnSpc>
+                <a:spcPts val="1200"/>
+              </a:lnSpc>
+              <a:spcAft>
+                <a:spcPts val="800"/>
+              </a:spcAft>
+            </a:pPr>
+            <a:r>
+              <a:rPr lang="en-US" sz="1800" kern="100" dirty="0">
+                <a:effectLst/>
+                <a:latin typeface="Aptos" panose="020B0004020202020204" pitchFamily="34" charset="0"/>
+                <a:ea typeface="Times New Roman" panose="02020603050405020304" pitchFamily="18" charset="0"/>
+                <a:cs typeface="Times New Roman" panose="02020603050405020304" pitchFamily="18" charset="0"/>
+                <a:hlinkClick r:id="rId2"/>
+              </a:rPr>
+              <a:t>PowerShell Documentation</a:t>
+            </a:r>
+            <a:endParaRPr lang="en-US" sz="1800" kern="100" dirty="0">
+              <a:effectLst/>
+              <a:latin typeface="Aptos" panose="020B0004020202020204" pitchFamily="34" charset="0"/>
+              <a:ea typeface="Times New Roman" panose="02020603050405020304" pitchFamily="18" charset="0"/>
+              <a:cs typeface="Times New Roman" panose="02020603050405020304" pitchFamily="18" charset="0"/>
+            </a:endParaRPr>
+          </a:p>
+          <a:p>
+            <a:pPr marL="711200" lvl="1">
+              <a:lnSpc>
+                <a:spcPts val="1200"/>
+              </a:lnSpc>
+              <a:spcAft>
+                <a:spcPts val="800"/>
+              </a:spcAft>
+            </a:pPr>
+            <a:r>
+              <a:rPr lang="en-US" sz="1400" kern="100" dirty="0">
+                <a:effectLst/>
+                <a:latin typeface="Aptos" panose="020B0004020202020204" pitchFamily="34" charset="0"/>
+                <a:ea typeface="Times New Roman" panose="02020603050405020304" pitchFamily="18" charset="0"/>
+                <a:cs typeface="Times New Roman" panose="02020603050405020304" pitchFamily="18" charset="0"/>
+              </a:rPr>
+              <a:t>https://learn.microsoft.com/en-us/powershell/</a:t>
+            </a:r>
+          </a:p>
+          <a:p>
+            <a:pPr marL="254000">
+              <a:lnSpc>
+                <a:spcPts val="1200"/>
+              </a:lnSpc>
+              <a:spcAft>
+                <a:spcPts val="800"/>
+              </a:spcAft>
+            </a:pPr>
+            <a:r>
+              <a:rPr lang="en-US" sz="1800" kern="100" dirty="0">
+                <a:effectLst/>
+                <a:latin typeface="Aptos" panose="020B0004020202020204" pitchFamily="34" charset="0"/>
+                <a:ea typeface="Times New Roman" panose="02020603050405020304" pitchFamily="18" charset="0"/>
+                <a:cs typeface="Times New Roman" panose="02020603050405020304" pitchFamily="18" charset="0"/>
+                <a:hlinkClick r:id="rId3"/>
+              </a:rPr>
+              <a:t>PSKoans</a:t>
+            </a:r>
+            <a:endParaRPr lang="en-US" sz="1800" kern="100" dirty="0">
+              <a:effectLst/>
+              <a:latin typeface="Aptos" panose="020B0004020202020204" pitchFamily="34" charset="0"/>
+              <a:ea typeface="Times New Roman" panose="02020603050405020304" pitchFamily="18" charset="0"/>
+              <a:cs typeface="Times New Roman" panose="02020603050405020304" pitchFamily="18" charset="0"/>
+            </a:endParaRPr>
+          </a:p>
+          <a:p>
+            <a:pPr marL="711200" lvl="1">
+              <a:lnSpc>
+                <a:spcPts val="1200"/>
+              </a:lnSpc>
+              <a:spcAft>
+                <a:spcPts val="800"/>
+              </a:spcAft>
+            </a:pPr>
+            <a:r>
+              <a:rPr lang="en-US" sz="1400" kern="100" dirty="0">
+                <a:effectLst/>
+                <a:latin typeface="Aptos" panose="020B0004020202020204" pitchFamily="34" charset="0"/>
+                <a:ea typeface="Times New Roman" panose="02020603050405020304" pitchFamily="18" charset="0"/>
+                <a:cs typeface="Times New Roman" panose="02020603050405020304" pitchFamily="18" charset="0"/>
+              </a:rPr>
+              <a:t>https://github.com/vexx32/PSKoans</a:t>
+            </a:r>
+          </a:p>
+          <a:p>
+            <a:pPr marL="254000">
+              <a:lnSpc>
+                <a:spcPts val="1200"/>
+              </a:lnSpc>
+              <a:spcAft>
+                <a:spcPts val="800"/>
+              </a:spcAft>
+            </a:pPr>
+            <a:r>
+              <a:rPr lang="en-US" sz="1800" kern="100" dirty="0">
+                <a:effectLst/>
+                <a:latin typeface="Aptos" panose="020B0004020202020204" pitchFamily="34" charset="0"/>
+                <a:ea typeface="Times New Roman" panose="02020603050405020304" pitchFamily="18" charset="0"/>
+                <a:cs typeface="Times New Roman" panose="02020603050405020304" pitchFamily="18" charset="0"/>
+                <a:hlinkClick r:id="rId4"/>
+              </a:rPr>
+              <a:t>Community Best Practices</a:t>
+            </a:r>
+            <a:endParaRPr lang="en-US" sz="1800" kern="100" dirty="0">
+              <a:effectLst/>
+              <a:latin typeface="Aptos" panose="020B0004020202020204" pitchFamily="34" charset="0"/>
+              <a:ea typeface="Times New Roman" panose="02020603050405020304" pitchFamily="18" charset="0"/>
+              <a:cs typeface="Times New Roman" panose="02020603050405020304" pitchFamily="18" charset="0"/>
+            </a:endParaRPr>
+          </a:p>
+          <a:p>
+            <a:pPr marL="711200" lvl="1">
+              <a:lnSpc>
+                <a:spcPts val="1200"/>
+              </a:lnSpc>
+              <a:spcAft>
+                <a:spcPts val="800"/>
+              </a:spcAft>
+            </a:pPr>
+            <a:r>
+              <a:rPr lang="en-US" sz="1400" kern="100" dirty="0">
+                <a:effectLst/>
+                <a:latin typeface="Aptos" panose="020B0004020202020204" pitchFamily="34" charset="0"/>
+                <a:ea typeface="Times New Roman" panose="02020603050405020304" pitchFamily="18" charset="0"/>
+                <a:cs typeface="Times New Roman" panose="02020603050405020304" pitchFamily="18" charset="0"/>
+              </a:rPr>
+              <a:t>https://github.com/PoshCode/PowerShellPracticeAndStyle</a:t>
+            </a:r>
+          </a:p>
+          <a:p>
+            <a:pPr marL="254000">
+              <a:lnSpc>
+                <a:spcPts val="1200"/>
+              </a:lnSpc>
+              <a:spcAft>
+                <a:spcPts val="800"/>
+              </a:spcAft>
+            </a:pPr>
+            <a:r>
+              <a:rPr lang="en-US" sz="1800" kern="100" dirty="0">
+                <a:effectLst/>
+                <a:latin typeface="Aptos" panose="020B0004020202020204" pitchFamily="34" charset="0"/>
+                <a:ea typeface="Times New Roman" panose="02020603050405020304" pitchFamily="18" charset="0"/>
+                <a:cs typeface="Times New Roman" panose="02020603050405020304" pitchFamily="18" charset="0"/>
+                <a:hlinkClick r:id="rId5"/>
+              </a:rPr>
+              <a:t>Learn PowerShell in a Month of Lunches,  4:th Edition</a:t>
+            </a:r>
+            <a:endParaRPr lang="en-US" sz="1800" kern="100" dirty="0">
+              <a:effectLst/>
+              <a:latin typeface="Aptos" panose="020B0004020202020204" pitchFamily="34" charset="0"/>
+              <a:ea typeface="Times New Roman" panose="02020603050405020304" pitchFamily="18" charset="0"/>
+              <a:cs typeface="Times New Roman" panose="02020603050405020304" pitchFamily="18" charset="0"/>
+            </a:endParaRPr>
+          </a:p>
+          <a:p>
+            <a:pPr marL="711200" lvl="1">
+              <a:lnSpc>
+                <a:spcPts val="1200"/>
+              </a:lnSpc>
+              <a:spcAft>
+                <a:spcPts val="800"/>
+              </a:spcAft>
+            </a:pPr>
+            <a:r>
+              <a:rPr lang="en-US" sz="1400" kern="100" dirty="0">
+                <a:effectLst/>
+                <a:latin typeface="Aptos" panose="020B0004020202020204" pitchFamily="34" charset="0"/>
+                <a:ea typeface="Times New Roman" panose="02020603050405020304" pitchFamily="18" charset="0"/>
+                <a:cs typeface="Times New Roman" panose="02020603050405020304" pitchFamily="18" charset="0"/>
+              </a:rPr>
+              <a:t>https://www.manning.com/books/learn-powershell-in-a-month-of-lunches</a:t>
+            </a:r>
+            <a:endParaRPr lang="en-US" sz="1800" kern="100" dirty="0">
+              <a:effectLst/>
+              <a:latin typeface="Aptos" panose="020B0004020202020204" pitchFamily="34" charset="0"/>
+              <a:ea typeface="Times New Roman" panose="02020603050405020304" pitchFamily="18" charset="0"/>
+              <a:cs typeface="Times New Roman" panose="02020603050405020304" pitchFamily="18" charset="0"/>
+            </a:endParaRPr>
+          </a:p>
+          <a:p>
+            <a:pPr marL="254000">
+              <a:lnSpc>
+                <a:spcPts val="1200"/>
+              </a:lnSpc>
+              <a:spcAft>
+                <a:spcPts val="800"/>
+              </a:spcAft>
+            </a:pPr>
+            <a:r>
+              <a:rPr lang="en-US" sz="1800" kern="100" dirty="0">
+                <a:effectLst/>
+                <a:latin typeface="Aptos" panose="020B0004020202020204" pitchFamily="34" charset="0"/>
+                <a:ea typeface="Times New Roman" panose="02020603050405020304" pitchFamily="18" charset="0"/>
+                <a:cs typeface="Times New Roman" panose="02020603050405020304" pitchFamily="18" charset="0"/>
+                <a:hlinkClick r:id="rId6"/>
+              </a:rPr>
+              <a:t>Automate administrative tasks by using PowerShell – Learn</a:t>
+            </a:r>
+            <a:endParaRPr lang="en-US" sz="1800" kern="100" dirty="0">
+              <a:effectLst/>
+              <a:latin typeface="Aptos" panose="020B0004020202020204" pitchFamily="34" charset="0"/>
+              <a:ea typeface="Times New Roman" panose="02020603050405020304" pitchFamily="18" charset="0"/>
+              <a:cs typeface="Times New Roman" panose="02020603050405020304" pitchFamily="18" charset="0"/>
+            </a:endParaRPr>
+          </a:p>
+          <a:p>
+            <a:pPr marL="711200" lvl="1">
+              <a:lnSpc>
+                <a:spcPts val="1200"/>
+              </a:lnSpc>
+              <a:spcAft>
+                <a:spcPts val="800"/>
+              </a:spcAft>
+            </a:pPr>
+            <a:r>
+              <a:rPr lang="en-US" sz="1400" kern="100" dirty="0">
+                <a:effectLst/>
+                <a:latin typeface="Aptos" panose="020B0004020202020204" pitchFamily="34" charset="0"/>
+                <a:ea typeface="Times New Roman" panose="02020603050405020304" pitchFamily="18" charset="0"/>
+                <a:cs typeface="Times New Roman" panose="02020603050405020304" pitchFamily="18" charset="0"/>
+              </a:rPr>
+              <a:t>https://learn.microsoft.com/en-us/training/paths/powershell/</a:t>
+            </a:r>
           </a:p>
         </p:txBody>
       </p:sp>
@@ -18086,7 +18175,7 @@
           <p:cNvPr id="4" name="Footer Placeholder 3">
             <a:extLst>
               <a:ext uri="{FF2B5EF4-FFF2-40B4-BE49-F238E27FC236}">
-                <a16:creationId xmlns:a16="http://schemas.microsoft.com/office/drawing/2014/main" id="{AFF17C74-066C-F6D3-8B07-3A4273A5590B}"/>
+                <a16:creationId xmlns:a16="http://schemas.microsoft.com/office/drawing/2014/main" id="{DFC4B1A9-C5E5-6767-5A67-3AFFF61F8AE3}"/>
               </a:ext>
             </a:extLst>
           </p:cNvPr>
@@ -18115,7 +18204,7 @@
           <p:cNvPr id="5" name="Slide Number Placeholder 4">
             <a:extLst>
               <a:ext uri="{FF2B5EF4-FFF2-40B4-BE49-F238E27FC236}">
-                <a16:creationId xmlns:a16="http://schemas.microsoft.com/office/drawing/2014/main" id="{20FE1399-C7F6-1C33-DF5B-DE42A78C5F7F}"/>
+                <a16:creationId xmlns:a16="http://schemas.microsoft.com/office/drawing/2014/main" id="{BAD258B7-9534-6ABE-261E-70D2894B8FD8}"/>
               </a:ext>
             </a:extLst>
           </p:cNvPr>
@@ -18131,7 +18220,7 @@
           <a:bodyPr/>
           <a:lstStyle/>
           <a:p>
-            <a:fld id="{BFEA1545-8540-491B-83AB-51C306516EA6}" type="slidenum">
+            <a:fld id="{9993A830-6DA6-4394-A358-10250CDB3A67}" type="slidenum">
               <a:rPr lang="en-SE" smtClean="0"/>
               <a:t>67</a:t>
             </a:fld>
@@ -18142,7 +18231,7 @@
     </p:spTree>
     <p:extLst>
       <p:ext uri="{BB962C8B-B14F-4D97-AF65-F5344CB8AC3E}">
-        <p14:creationId xmlns:p14="http://schemas.microsoft.com/office/powerpoint/2010/main" val="946311230"/>
+        <p14:creationId xmlns:p14="http://schemas.microsoft.com/office/powerpoint/2010/main" val="2832576292"/>
       </p:ext>
     </p:extLst>
   </p:cSld>
@@ -18174,7 +18263,7 @@
           <p:cNvPr id="2" name="Title 1">
             <a:extLst>
               <a:ext uri="{FF2B5EF4-FFF2-40B4-BE49-F238E27FC236}">
-                <a16:creationId xmlns:a16="http://schemas.microsoft.com/office/drawing/2014/main" id="{020D5667-3F2E-0371-B2AF-410D252A6CEA}"/>
+                <a16:creationId xmlns:a16="http://schemas.microsoft.com/office/drawing/2014/main" id="{55D23047-3833-EFE0-8A01-090ACFE1D9FC}"/>
               </a:ext>
             </a:extLst>
           </p:cNvPr>
@@ -18185,23 +18274,18 @@
             <p:ph type="title"/>
           </p:nvPr>
         </p:nvSpPr>
-        <p:spPr>
-          <a:xfrm>
-            <a:off x="838200" y="365125"/>
-            <a:ext cx="10515600" cy="1325563"/>
-          </a:xfrm>
-        </p:spPr>
-        <p:txBody>
-          <a:bodyPr/>
-          <a:lstStyle/>
-          <a:p>
-            <a:pPr marR="0" rtl="0"/>
-            <a:r>
-              <a:rPr lang="en-GB" b="0" i="0" u="none" strike="noStrike" baseline="0" dirty="0">
+        <p:spPr/>
+        <p:txBody>
+          <a:bodyPr/>
+          <a:lstStyle/>
+          <a:p>
+            <a:r>
+              <a:rPr lang="en-GB" b="1" i="0" u="none" strike="noStrike" baseline="0" dirty="0">
                 <a:latin typeface="Arial" panose="020B0604020202020204" pitchFamily="34" charset="0"/>
               </a:rPr>
               <a:t>Version Control</a:t>
             </a:r>
+            <a:endParaRPr lang="en-SE" dirty="0"/>
           </a:p>
         </p:txBody>
       </p:sp>
@@ -18210,7 +18294,7 @@
           <p:cNvPr id="3" name="Text Placeholder 2">
             <a:extLst>
               <a:ext uri="{FF2B5EF4-FFF2-40B4-BE49-F238E27FC236}">
-                <a16:creationId xmlns:a16="http://schemas.microsoft.com/office/drawing/2014/main" id="{14842F41-DE27-3397-05EB-81DCA4DF63A8}"/>
+                <a16:creationId xmlns:a16="http://schemas.microsoft.com/office/drawing/2014/main" id="{1F80B5F8-E4FB-9CDB-0C7C-EEDCB4B8AF1D}"/>
               </a:ext>
             </a:extLst>
           </p:cNvPr>
@@ -18223,135 +18307,10 @@
         </p:nvSpPr>
         <p:spPr/>
         <p:txBody>
-          <a:bodyPr>
-            <a:normAutofit lnSpcReduction="10000"/>
-          </a:bodyPr>
-          <a:lstStyle/>
-          <a:p>
-            <a:pPr marR="0" lvl="0" rtl="0"/>
-            <a:r>
-              <a:rPr lang="en-US" b="0" i="0" u="none" strike="noStrike" baseline="0" dirty="0">
-                <a:latin typeface="Arial" panose="020B0604020202020204" pitchFamily="34" charset="0"/>
-              </a:rPr>
-              <a:t>git</a:t>
-            </a:r>
-          </a:p>
-          <a:p>
-            <a:pPr lvl="1"/>
-            <a:r>
-              <a:rPr lang="en-US" b="0" i="0" u="none" strike="noStrike" baseline="0" dirty="0">
-                <a:latin typeface="Arial" panose="020B0604020202020204" pitchFamily="34" charset="0"/>
-              </a:rPr>
-              <a:t>hosts</a:t>
-            </a:r>
-          </a:p>
-          <a:p>
-            <a:pPr lvl="2"/>
-            <a:r>
-              <a:rPr lang="en-US" b="0" i="0" u="none" strike="noStrike" baseline="0" dirty="0">
-                <a:latin typeface="Arial" panose="020B0604020202020204" pitchFamily="34" charset="0"/>
-              </a:rPr>
-              <a:t>GitHub</a:t>
-            </a:r>
-          </a:p>
-          <a:p>
-            <a:pPr lvl="2"/>
-            <a:r>
-              <a:rPr lang="en-US" b="0" i="0" u="none" strike="noStrike" baseline="0" dirty="0">
-                <a:latin typeface="Arial" panose="020B0604020202020204" pitchFamily="34" charset="0"/>
-              </a:rPr>
-              <a:t>Azure DevOps</a:t>
-            </a:r>
-          </a:p>
-          <a:p>
-            <a:pPr lvl="2"/>
-            <a:r>
-              <a:rPr lang="en-US" b="0" i="0" u="none" strike="noStrike" baseline="0" dirty="0">
-                <a:latin typeface="Arial" panose="020B0604020202020204" pitchFamily="34" charset="0"/>
-              </a:rPr>
-              <a:t>Bitbucket</a:t>
-            </a:r>
-          </a:p>
-          <a:p>
-            <a:pPr lvl="2"/>
-            <a:r>
-              <a:rPr lang="en-US" b="0" i="0" u="none" strike="noStrike" baseline="0" dirty="0">
-                <a:latin typeface="Arial" panose="020B0604020202020204" pitchFamily="34" charset="0"/>
-              </a:rPr>
-              <a:t>GitLab</a:t>
-            </a:r>
-          </a:p>
-          <a:p>
-            <a:pPr lvl="1"/>
-            <a:r>
-              <a:rPr lang="en-US" b="0" i="0" u="none" strike="noStrike" baseline="0" dirty="0">
-                <a:latin typeface="Arial" panose="020B0604020202020204" pitchFamily="34" charset="0"/>
-              </a:rPr>
-              <a:t>Quick start</a:t>
-            </a:r>
-          </a:p>
-          <a:p>
-            <a:pPr lvl="2"/>
-            <a:r>
-              <a:rPr lang="en-US" b="0" i="0" u="none" strike="noStrike" baseline="0" dirty="0">
-                <a:latin typeface="Arial" panose="020B0604020202020204" pitchFamily="34" charset="0"/>
-              </a:rPr>
-              <a:t>git clone</a:t>
-            </a:r>
-          </a:p>
-          <a:p>
-            <a:pPr lvl="2"/>
-            <a:r>
-              <a:rPr lang="en-US" b="0" i="0" u="none" strike="noStrike" baseline="0" dirty="0">
-                <a:latin typeface="Arial" panose="020B0604020202020204" pitchFamily="34" charset="0"/>
-              </a:rPr>
-              <a:t>git add</a:t>
-            </a:r>
-          </a:p>
-          <a:p>
-            <a:pPr lvl="2"/>
-            <a:r>
-              <a:rPr lang="en-US" b="0" i="0" u="none" strike="noStrike" baseline="0" dirty="0">
-                <a:latin typeface="Arial" panose="020B0604020202020204" pitchFamily="34" charset="0"/>
-              </a:rPr>
-              <a:t>git commit -m 'message'</a:t>
-            </a:r>
-          </a:p>
-          <a:p>
-            <a:pPr lvl="2"/>
-            <a:r>
-              <a:rPr lang="en-US" b="0" i="0" u="none" strike="noStrike" baseline="0" dirty="0">
-                <a:latin typeface="Arial" panose="020B0604020202020204" pitchFamily="34" charset="0"/>
-              </a:rPr>
-              <a:t>git push</a:t>
-            </a:r>
-          </a:p>
-          <a:p>
-            <a:pPr marR="0" lvl="0" rtl="0"/>
-            <a:r>
-              <a:rPr lang="en-US" b="0" i="0" u="none" strike="noStrike" baseline="0" dirty="0" err="1">
-                <a:latin typeface="Arial" panose="020B0604020202020204" pitchFamily="34" charset="0"/>
-              </a:rPr>
-              <a:t>svn</a:t>
-            </a:r>
-            <a:r>
-              <a:rPr lang="en-US" b="0" i="0" u="none" strike="noStrike" baseline="0" dirty="0">
-                <a:latin typeface="Arial" panose="020B0604020202020204" pitchFamily="34" charset="0"/>
-              </a:rPr>
-              <a:t> / </a:t>
-            </a:r>
-            <a:r>
-              <a:rPr lang="en-US" b="0" i="0" u="none" strike="noStrike" baseline="0" dirty="0" err="1">
-                <a:latin typeface="Arial" panose="020B0604020202020204" pitchFamily="34" charset="0"/>
-              </a:rPr>
-              <a:t>tfvc</a:t>
-            </a:r>
-            <a:r>
-              <a:rPr lang="en-US" b="0" i="0" u="none" strike="noStrike" baseline="0" dirty="0">
-                <a:latin typeface="Arial" panose="020B0604020202020204" pitchFamily="34" charset="0"/>
-              </a:rPr>
-              <a:t> / others</a:t>
-            </a:r>
+          <a:bodyPr/>
+          <a:lstStyle/>
+          <a:p>
+            <a:endParaRPr lang="en-SE"/>
           </a:p>
         </p:txBody>
       </p:sp>
@@ -18360,7 +18319,7 @@
           <p:cNvPr id="4" name="Footer Placeholder 3">
             <a:extLst>
               <a:ext uri="{FF2B5EF4-FFF2-40B4-BE49-F238E27FC236}">
-                <a16:creationId xmlns:a16="http://schemas.microsoft.com/office/drawing/2014/main" id="{DFC4B1A9-C5E5-6767-5A67-3AFFF61F8AE3}"/>
+                <a16:creationId xmlns:a16="http://schemas.microsoft.com/office/drawing/2014/main" id="{AFF17C74-066C-F6D3-8B07-3A4273A5590B}"/>
               </a:ext>
             </a:extLst>
           </p:cNvPr>
@@ -18389,7 +18348,7 @@
           <p:cNvPr id="5" name="Slide Number Placeholder 4">
             <a:extLst>
               <a:ext uri="{FF2B5EF4-FFF2-40B4-BE49-F238E27FC236}">
-                <a16:creationId xmlns:a16="http://schemas.microsoft.com/office/drawing/2014/main" id="{BAD258B7-9534-6ABE-261E-70D2894B8FD8}"/>
+                <a16:creationId xmlns:a16="http://schemas.microsoft.com/office/drawing/2014/main" id="{20FE1399-C7F6-1C33-DF5B-DE42A78C5F7F}"/>
               </a:ext>
             </a:extLst>
           </p:cNvPr>
@@ -18405,7 +18364,7 @@
           <a:bodyPr/>
           <a:lstStyle/>
           <a:p>
-            <a:fld id="{9993A830-6DA6-4394-A358-10250CDB3A67}" type="slidenum">
+            <a:fld id="{BFEA1545-8540-491B-83AB-51C306516EA6}" type="slidenum">
               <a:rPr lang="en-SE" smtClean="0"/>
               <a:t>68</a:t>
             </a:fld>
@@ -18416,7 +18375,7 @@
     </p:spTree>
     <p:extLst>
       <p:ext uri="{BB962C8B-B14F-4D97-AF65-F5344CB8AC3E}">
-        <p14:creationId xmlns:p14="http://schemas.microsoft.com/office/powerpoint/2010/main" val="1063679628"/>
+        <p14:creationId xmlns:p14="http://schemas.microsoft.com/office/powerpoint/2010/main" val="946311230"/>
       </p:ext>
     </p:extLst>
   </p:cSld>
@@ -18448,7 +18407,7 @@
           <p:cNvPr id="2" name="Title 1">
             <a:extLst>
               <a:ext uri="{FF2B5EF4-FFF2-40B4-BE49-F238E27FC236}">
-                <a16:creationId xmlns:a16="http://schemas.microsoft.com/office/drawing/2014/main" id="{55D23047-3833-EFE0-8A01-090ACFE1D9FC}"/>
+                <a16:creationId xmlns:a16="http://schemas.microsoft.com/office/drawing/2014/main" id="{020D5667-3F2E-0371-B2AF-410D252A6CEA}"/>
               </a:ext>
             </a:extLst>
           </p:cNvPr>
@@ -18459,18 +18418,23 @@
             <p:ph type="title"/>
           </p:nvPr>
         </p:nvSpPr>
-        <p:spPr/>
-        <p:txBody>
-          <a:bodyPr/>
-          <a:lstStyle/>
-          <a:p>
-            <a:r>
-              <a:rPr lang="en-GB" b="1" i="0" u="none" strike="noStrike" baseline="0" dirty="0">
-                <a:latin typeface="Arial" panose="020B0604020202020204" pitchFamily="34" charset="0"/>
-              </a:rPr>
-              <a:t>Best Practices</a:t>
-            </a:r>
-            <a:endParaRPr lang="en-SE" dirty="0"/>
+        <p:spPr>
+          <a:xfrm>
+            <a:off x="838200" y="365125"/>
+            <a:ext cx="10515600" cy="1325563"/>
+          </a:xfrm>
+        </p:spPr>
+        <p:txBody>
+          <a:bodyPr/>
+          <a:lstStyle/>
+          <a:p>
+            <a:pPr marR="0" rtl="0"/>
+            <a:r>
+              <a:rPr lang="en-GB" b="0" i="0" u="none" strike="noStrike" baseline="0" dirty="0">
+                <a:latin typeface="Arial" panose="020B0604020202020204" pitchFamily="34" charset="0"/>
+              </a:rPr>
+              <a:t>Version Control</a:t>
+            </a:r>
           </a:p>
         </p:txBody>
       </p:sp>
@@ -18479,7 +18443,7 @@
           <p:cNvPr id="3" name="Text Placeholder 2">
             <a:extLst>
               <a:ext uri="{FF2B5EF4-FFF2-40B4-BE49-F238E27FC236}">
-                <a16:creationId xmlns:a16="http://schemas.microsoft.com/office/drawing/2014/main" id="{1F80B5F8-E4FB-9CDB-0C7C-EEDCB4B8AF1D}"/>
+                <a16:creationId xmlns:a16="http://schemas.microsoft.com/office/drawing/2014/main" id="{14842F41-DE27-3397-05EB-81DCA4DF63A8}"/>
               </a:ext>
             </a:extLst>
           </p:cNvPr>
@@ -18492,10 +18456,135 @@
         </p:nvSpPr>
         <p:spPr/>
         <p:txBody>
-          <a:bodyPr/>
-          <a:lstStyle/>
-          <a:p>
-            <a:endParaRPr lang="en-SE"/>
+          <a:bodyPr>
+            <a:normAutofit lnSpcReduction="10000"/>
+          </a:bodyPr>
+          <a:lstStyle/>
+          <a:p>
+            <a:pPr marR="0" lvl="0" rtl="0"/>
+            <a:r>
+              <a:rPr lang="en-US" b="0" i="0" u="none" strike="noStrike" baseline="0" dirty="0">
+                <a:latin typeface="Arial" panose="020B0604020202020204" pitchFamily="34" charset="0"/>
+              </a:rPr>
+              <a:t>git</a:t>
+            </a:r>
+          </a:p>
+          <a:p>
+            <a:pPr lvl="1"/>
+            <a:r>
+              <a:rPr lang="en-US" b="0" i="0" u="none" strike="noStrike" baseline="0" dirty="0">
+                <a:latin typeface="Arial" panose="020B0604020202020204" pitchFamily="34" charset="0"/>
+              </a:rPr>
+              <a:t>hosts</a:t>
+            </a:r>
+          </a:p>
+          <a:p>
+            <a:pPr lvl="2"/>
+            <a:r>
+              <a:rPr lang="en-US" b="0" i="0" u="none" strike="noStrike" baseline="0" dirty="0">
+                <a:latin typeface="Arial" panose="020B0604020202020204" pitchFamily="34" charset="0"/>
+              </a:rPr>
+              <a:t>GitHub</a:t>
+            </a:r>
+          </a:p>
+          <a:p>
+            <a:pPr lvl="2"/>
+            <a:r>
+              <a:rPr lang="en-US" b="0" i="0" u="none" strike="noStrike" baseline="0" dirty="0">
+                <a:latin typeface="Arial" panose="020B0604020202020204" pitchFamily="34" charset="0"/>
+              </a:rPr>
+              <a:t>Azure DevOps</a:t>
+            </a:r>
+          </a:p>
+          <a:p>
+            <a:pPr lvl="2"/>
+            <a:r>
+              <a:rPr lang="en-US" b="0" i="0" u="none" strike="noStrike" baseline="0" dirty="0">
+                <a:latin typeface="Arial" panose="020B0604020202020204" pitchFamily="34" charset="0"/>
+              </a:rPr>
+              <a:t>Bitbucket</a:t>
+            </a:r>
+          </a:p>
+          <a:p>
+            <a:pPr lvl="2"/>
+            <a:r>
+              <a:rPr lang="en-US" b="0" i="0" u="none" strike="noStrike" baseline="0" dirty="0">
+                <a:latin typeface="Arial" panose="020B0604020202020204" pitchFamily="34" charset="0"/>
+              </a:rPr>
+              <a:t>GitLab</a:t>
+            </a:r>
+          </a:p>
+          <a:p>
+            <a:pPr lvl="1"/>
+            <a:r>
+              <a:rPr lang="en-US" b="0" i="0" u="none" strike="noStrike" baseline="0" dirty="0">
+                <a:latin typeface="Arial" panose="020B0604020202020204" pitchFamily="34" charset="0"/>
+              </a:rPr>
+              <a:t>Quick start</a:t>
+            </a:r>
+          </a:p>
+          <a:p>
+            <a:pPr lvl="2"/>
+            <a:r>
+              <a:rPr lang="en-US" b="0" i="0" u="none" strike="noStrike" baseline="0" dirty="0">
+                <a:latin typeface="Arial" panose="020B0604020202020204" pitchFamily="34" charset="0"/>
+              </a:rPr>
+              <a:t>git clone</a:t>
+            </a:r>
+          </a:p>
+          <a:p>
+            <a:pPr lvl="2"/>
+            <a:r>
+              <a:rPr lang="en-US" b="0" i="0" u="none" strike="noStrike" baseline="0" dirty="0">
+                <a:latin typeface="Arial" panose="020B0604020202020204" pitchFamily="34" charset="0"/>
+              </a:rPr>
+              <a:t>git add</a:t>
+            </a:r>
+          </a:p>
+          <a:p>
+            <a:pPr lvl="2"/>
+            <a:r>
+              <a:rPr lang="en-US" b="0" i="0" u="none" strike="noStrike" baseline="0" dirty="0">
+                <a:latin typeface="Arial" panose="020B0604020202020204" pitchFamily="34" charset="0"/>
+              </a:rPr>
+              <a:t>git commit -m 'message'</a:t>
+            </a:r>
+          </a:p>
+          <a:p>
+            <a:pPr lvl="2"/>
+            <a:r>
+              <a:rPr lang="en-US" b="0" i="0" u="none" strike="noStrike" baseline="0" dirty="0">
+                <a:latin typeface="Arial" panose="020B0604020202020204" pitchFamily="34" charset="0"/>
+              </a:rPr>
+              <a:t>git push</a:t>
+            </a:r>
+          </a:p>
+          <a:p>
+            <a:pPr marR="0" lvl="0" rtl="0"/>
+            <a:r>
+              <a:rPr lang="en-US" b="0" i="0" u="none" strike="noStrike" baseline="0" dirty="0" err="1">
+                <a:latin typeface="Arial" panose="020B0604020202020204" pitchFamily="34" charset="0"/>
+              </a:rPr>
+              <a:t>svn</a:t>
+            </a:r>
+            <a:r>
+              <a:rPr lang="en-US" b="0" i="0" u="none" strike="noStrike" baseline="0" dirty="0">
+                <a:latin typeface="Arial" panose="020B0604020202020204" pitchFamily="34" charset="0"/>
+              </a:rPr>
+              <a:t> / </a:t>
+            </a:r>
+            <a:r>
+              <a:rPr lang="en-US" b="0" i="0" u="none" strike="noStrike" baseline="0" dirty="0" err="1">
+                <a:latin typeface="Arial" panose="020B0604020202020204" pitchFamily="34" charset="0"/>
+              </a:rPr>
+              <a:t>tfvc</a:t>
+            </a:r>
+            <a:r>
+              <a:rPr lang="en-US" b="0" i="0" u="none" strike="noStrike" baseline="0" dirty="0">
+                <a:latin typeface="Arial" panose="020B0604020202020204" pitchFamily="34" charset="0"/>
+              </a:rPr>
+              <a:t> / others</a:t>
+            </a:r>
           </a:p>
         </p:txBody>
       </p:sp>
@@ -18504,7 +18593,7 @@
           <p:cNvPr id="4" name="Footer Placeholder 3">
             <a:extLst>
               <a:ext uri="{FF2B5EF4-FFF2-40B4-BE49-F238E27FC236}">
-                <a16:creationId xmlns:a16="http://schemas.microsoft.com/office/drawing/2014/main" id="{AFF17C74-066C-F6D3-8B07-3A4273A5590B}"/>
+                <a16:creationId xmlns:a16="http://schemas.microsoft.com/office/drawing/2014/main" id="{DFC4B1A9-C5E5-6767-5A67-3AFFF61F8AE3}"/>
               </a:ext>
             </a:extLst>
           </p:cNvPr>
@@ -18533,7 +18622,7 @@
           <p:cNvPr id="5" name="Slide Number Placeholder 4">
             <a:extLst>
               <a:ext uri="{FF2B5EF4-FFF2-40B4-BE49-F238E27FC236}">
-                <a16:creationId xmlns:a16="http://schemas.microsoft.com/office/drawing/2014/main" id="{20FE1399-C7F6-1C33-DF5B-DE42A78C5F7F}"/>
+                <a16:creationId xmlns:a16="http://schemas.microsoft.com/office/drawing/2014/main" id="{BAD258B7-9534-6ABE-261E-70D2894B8FD8}"/>
               </a:ext>
             </a:extLst>
           </p:cNvPr>
@@ -18549,7 +18638,7 @@
           <a:bodyPr/>
           <a:lstStyle/>
           <a:p>
-            <a:fld id="{BFEA1545-8540-491B-83AB-51C306516EA6}" type="slidenum">
+            <a:fld id="{9993A830-6DA6-4394-A358-10250CDB3A67}" type="slidenum">
               <a:rPr lang="en-SE" smtClean="0"/>
               <a:t>69</a:t>
             </a:fld>
@@ -18560,7 +18649,7 @@
     </p:spTree>
     <p:extLst>
       <p:ext uri="{BB962C8B-B14F-4D97-AF65-F5344CB8AC3E}">
-        <p14:creationId xmlns:p14="http://schemas.microsoft.com/office/powerpoint/2010/main" val="111630529"/>
+        <p14:creationId xmlns:p14="http://schemas.microsoft.com/office/powerpoint/2010/main" val="1063679628"/>
       </p:ext>
     </p:extLst>
   </p:cSld>
@@ -18832,7 +18921,7 @@
           <p:cNvPr id="2" name="Title 1">
             <a:extLst>
               <a:ext uri="{FF2B5EF4-FFF2-40B4-BE49-F238E27FC236}">
-                <a16:creationId xmlns:a16="http://schemas.microsoft.com/office/drawing/2014/main" id="{020D5667-3F2E-0371-B2AF-410D252A6CEA}"/>
+                <a16:creationId xmlns:a16="http://schemas.microsoft.com/office/drawing/2014/main" id="{55D23047-3833-EFE0-8A01-090ACFE1D9FC}"/>
               </a:ext>
             </a:extLst>
           </p:cNvPr>
@@ -18843,26 +18932,18 @@
             <p:ph type="title"/>
           </p:nvPr>
         </p:nvSpPr>
-        <p:spPr>
-          <a:xfrm>
-            <a:off x="838200" y="365125"/>
-            <a:ext cx="10515600" cy="1325563"/>
-          </a:xfrm>
-        </p:spPr>
-        <p:txBody>
-          <a:bodyPr/>
-          <a:lstStyle/>
-          <a:p>
-            <a:pPr marR="0" rtl="0"/>
+        <p:spPr/>
+        <p:txBody>
+          <a:bodyPr/>
+          <a:lstStyle/>
+          <a:p>
             <a:r>
               <a:rPr lang="en-GB" b="1" i="0" u="none" strike="noStrike" baseline="0" dirty="0">
                 <a:latin typeface="Arial" panose="020B0604020202020204" pitchFamily="34" charset="0"/>
               </a:rPr>
               <a:t>Best Practices</a:t>
             </a:r>
-            <a:endParaRPr lang="en-GB" b="0" i="0" u="none" strike="noStrike" baseline="0" dirty="0">
-              <a:latin typeface="Arial" panose="020B0604020202020204" pitchFamily="34" charset="0"/>
-            </a:endParaRPr>
+            <a:endParaRPr lang="en-SE" dirty="0"/>
           </a:p>
         </p:txBody>
       </p:sp>
@@ -18871,7 +18952,7 @@
           <p:cNvPr id="3" name="Text Placeholder 2">
             <a:extLst>
               <a:ext uri="{FF2B5EF4-FFF2-40B4-BE49-F238E27FC236}">
-                <a16:creationId xmlns:a16="http://schemas.microsoft.com/office/drawing/2014/main" id="{14842F41-DE27-3397-05EB-81DCA4DF63A8}"/>
+                <a16:creationId xmlns:a16="http://schemas.microsoft.com/office/drawing/2014/main" id="{1F80B5F8-E4FB-9CDB-0C7C-EEDCB4B8AF1D}"/>
               </a:ext>
             </a:extLst>
           </p:cNvPr>
@@ -18884,114 +18965,10 @@
         </p:nvSpPr>
         <p:spPr/>
         <p:txBody>
-          <a:bodyPr>
-            <a:normAutofit fontScale="92500" lnSpcReduction="10000"/>
-          </a:bodyPr>
-          <a:lstStyle/>
-          <a:p>
-            <a:pPr marR="0" lvl="0" rtl="0"/>
-            <a:r>
-              <a:rPr lang="en-US" b="0" i="0" u="none" strike="noStrike" baseline="0" dirty="0">
-                <a:latin typeface="Arial" panose="020B0604020202020204" pitchFamily="34" charset="0"/>
-              </a:rPr>
-              <a:t>Performance</a:t>
-            </a:r>
-          </a:p>
-          <a:p>
-            <a:pPr lvl="1"/>
-            <a:r>
-              <a:rPr lang="en-US" b="0" i="0" u="none" strike="noStrike" baseline="0" dirty="0">
-                <a:latin typeface="Arial" panose="020B0604020202020204" pitchFamily="34" charset="0"/>
-              </a:rPr>
-              <a:t>Filter left - Format right</a:t>
-            </a:r>
-          </a:p>
-          <a:p>
-            <a:pPr lvl="1"/>
-            <a:r>
-              <a:rPr lang="en-US" b="0" i="0" u="none" strike="noStrike" baseline="0" dirty="0">
-                <a:latin typeface="Arial" panose="020B0604020202020204" pitchFamily="34" charset="0"/>
-              </a:rPr>
-              <a:t>Measure-Command</a:t>
-            </a:r>
-          </a:p>
-          <a:p>
-            <a:pPr lvl="1"/>
-            <a:r>
-              <a:rPr lang="en-US" b="0" i="0" u="none" strike="noStrike" baseline="0" dirty="0">
-                <a:latin typeface="Arial" panose="020B0604020202020204" pitchFamily="34" charset="0"/>
-              </a:rPr>
-              <a:t>Pipelines</a:t>
-            </a:r>
-          </a:p>
-          <a:p>
-            <a:pPr lvl="1"/>
-            <a:r>
-              <a:rPr lang="en-US" b="0" i="0" u="none" strike="noStrike" baseline="0" dirty="0">
-                <a:latin typeface="Arial" panose="020B0604020202020204" pitchFamily="34" charset="0"/>
-              </a:rPr>
-              <a:t>Avoid Console Output</a:t>
-            </a:r>
-          </a:p>
-          <a:p>
-            <a:pPr lvl="1"/>
-            <a:r>
-              <a:rPr lang="en-US" b="0" i="0" u="none" strike="noStrike" baseline="0" dirty="0">
-                <a:latin typeface="Arial" panose="020B0604020202020204" pitchFamily="34" charset="0"/>
-              </a:rPr>
-              <a:t>Arrays</a:t>
-            </a:r>
-          </a:p>
-          <a:p>
-            <a:pPr marR="0" lvl="0" rtl="0"/>
-            <a:r>
-              <a:rPr lang="en-US" b="0" i="0" u="none" strike="noStrike" baseline="0" dirty="0">
-                <a:latin typeface="Arial" panose="020B0604020202020204" pitchFamily="34" charset="0"/>
-              </a:rPr>
-              <a:t>Readability</a:t>
-            </a:r>
-          </a:p>
-          <a:p>
-            <a:pPr lvl="1"/>
-            <a:r>
-              <a:rPr lang="en-US" b="0" i="0" u="none" strike="noStrike" baseline="0" dirty="0">
-                <a:latin typeface="Arial" panose="020B0604020202020204" pitchFamily="34" charset="0"/>
-              </a:rPr>
-              <a:t>Don't Use Aliases</a:t>
-            </a:r>
-          </a:p>
-          <a:p>
-            <a:pPr marR="0" lvl="0" rtl="0"/>
-            <a:r>
-              <a:rPr lang="en-US" b="0" i="0" u="none" strike="noStrike" baseline="0" dirty="0">
-                <a:latin typeface="Arial" panose="020B0604020202020204" pitchFamily="34" charset="0"/>
-              </a:rPr>
-              <a:t>Verb-Noun</a:t>
-            </a:r>
-          </a:p>
-          <a:p>
-            <a:pPr marR="0" lvl="0" rtl="0"/>
-            <a:r>
-              <a:rPr lang="en-US" b="0" i="0" u="none" strike="noStrike" baseline="0" dirty="0">
-                <a:latin typeface="Arial" panose="020B0604020202020204" pitchFamily="34" charset="0"/>
-              </a:rPr>
-              <a:t>$null on left side comparison</a:t>
-            </a:r>
-          </a:p>
-          <a:p>
-            <a:pPr marR="0" lvl="0" rtl="0"/>
-            <a:r>
-              <a:rPr lang="en-US" b="0" i="0" u="none" strike="noStrike" baseline="0" dirty="0" err="1">
-                <a:latin typeface="Arial" panose="020B0604020202020204" pitchFamily="34" charset="0"/>
-              </a:rPr>
-              <a:t>VSCode</a:t>
-            </a:r>
-            <a:r>
-              <a:rPr lang="en-US" b="0" i="0" u="none" strike="noStrike" baseline="0" dirty="0">
-                <a:latin typeface="Arial" panose="020B0604020202020204" pitchFamily="34" charset="0"/>
-              </a:rPr>
-              <a:t> Extensions</a:t>
-            </a:r>
+          <a:bodyPr/>
+          <a:lstStyle/>
+          <a:p>
+            <a:endParaRPr lang="en-SE"/>
           </a:p>
         </p:txBody>
       </p:sp>
@@ -19000,7 +18977,7 @@
           <p:cNvPr id="4" name="Footer Placeholder 3">
             <a:extLst>
               <a:ext uri="{FF2B5EF4-FFF2-40B4-BE49-F238E27FC236}">
-                <a16:creationId xmlns:a16="http://schemas.microsoft.com/office/drawing/2014/main" id="{DFC4B1A9-C5E5-6767-5A67-3AFFF61F8AE3}"/>
+                <a16:creationId xmlns:a16="http://schemas.microsoft.com/office/drawing/2014/main" id="{AFF17C74-066C-F6D3-8B07-3A4273A5590B}"/>
               </a:ext>
             </a:extLst>
           </p:cNvPr>
@@ -19029,7 +19006,7 @@
           <p:cNvPr id="5" name="Slide Number Placeholder 4">
             <a:extLst>
               <a:ext uri="{FF2B5EF4-FFF2-40B4-BE49-F238E27FC236}">
-                <a16:creationId xmlns:a16="http://schemas.microsoft.com/office/drawing/2014/main" id="{BAD258B7-9534-6ABE-261E-70D2894B8FD8}"/>
+                <a16:creationId xmlns:a16="http://schemas.microsoft.com/office/drawing/2014/main" id="{20FE1399-C7F6-1C33-DF5B-DE42A78C5F7F}"/>
               </a:ext>
             </a:extLst>
           </p:cNvPr>
@@ -19045,7 +19022,7 @@
           <a:bodyPr/>
           <a:lstStyle/>
           <a:p>
-            <a:fld id="{9993A830-6DA6-4394-A358-10250CDB3A67}" type="slidenum">
+            <a:fld id="{BFEA1545-8540-491B-83AB-51C306516EA6}" type="slidenum">
               <a:rPr lang="en-SE" smtClean="0"/>
               <a:t>70</a:t>
             </a:fld>
@@ -19056,7 +19033,7 @@
     </p:spTree>
     <p:extLst>
       <p:ext uri="{BB962C8B-B14F-4D97-AF65-F5344CB8AC3E}">
-        <p14:creationId xmlns:p14="http://schemas.microsoft.com/office/powerpoint/2010/main" val="3802939393"/>
+        <p14:creationId xmlns:p14="http://schemas.microsoft.com/office/powerpoint/2010/main" val="111630529"/>
       </p:ext>
     </p:extLst>
   </p:cSld>
@@ -19141,6 +19118,262 @@
         <p:spPr/>
         <p:txBody>
           <a:bodyPr>
+            <a:normAutofit fontScale="92500" lnSpcReduction="10000"/>
+          </a:bodyPr>
+          <a:lstStyle/>
+          <a:p>
+            <a:pPr marR="0" lvl="0" rtl="0"/>
+            <a:r>
+              <a:rPr lang="en-US" b="0" i="0" u="none" strike="noStrike" baseline="0" dirty="0">
+                <a:latin typeface="Arial" panose="020B0604020202020204" pitchFamily="34" charset="0"/>
+              </a:rPr>
+              <a:t>Performance</a:t>
+            </a:r>
+          </a:p>
+          <a:p>
+            <a:pPr lvl="1"/>
+            <a:r>
+              <a:rPr lang="en-US" b="0" i="0" u="none" strike="noStrike" baseline="0" dirty="0">
+                <a:latin typeface="Arial" panose="020B0604020202020204" pitchFamily="34" charset="0"/>
+              </a:rPr>
+              <a:t>Filter left - Format right</a:t>
+            </a:r>
+          </a:p>
+          <a:p>
+            <a:pPr lvl="1"/>
+            <a:r>
+              <a:rPr lang="en-US" b="0" i="0" u="none" strike="noStrike" baseline="0" dirty="0">
+                <a:latin typeface="Arial" panose="020B0604020202020204" pitchFamily="34" charset="0"/>
+              </a:rPr>
+              <a:t>Measure-Command</a:t>
+            </a:r>
+          </a:p>
+          <a:p>
+            <a:pPr lvl="1"/>
+            <a:r>
+              <a:rPr lang="en-US" b="0" i="0" u="none" strike="noStrike" baseline="0" dirty="0">
+                <a:latin typeface="Arial" panose="020B0604020202020204" pitchFamily="34" charset="0"/>
+              </a:rPr>
+              <a:t>Pipelines</a:t>
+            </a:r>
+          </a:p>
+          <a:p>
+            <a:pPr lvl="1"/>
+            <a:r>
+              <a:rPr lang="en-US" b="0" i="0" u="none" strike="noStrike" baseline="0" dirty="0">
+                <a:latin typeface="Arial" panose="020B0604020202020204" pitchFamily="34" charset="0"/>
+              </a:rPr>
+              <a:t>Avoid Console Output</a:t>
+            </a:r>
+          </a:p>
+          <a:p>
+            <a:pPr lvl="1"/>
+            <a:r>
+              <a:rPr lang="en-US" b="0" i="0" u="none" strike="noStrike" baseline="0" dirty="0">
+                <a:latin typeface="Arial" panose="020B0604020202020204" pitchFamily="34" charset="0"/>
+              </a:rPr>
+              <a:t>Arrays</a:t>
+            </a:r>
+          </a:p>
+          <a:p>
+            <a:pPr marR="0" lvl="0" rtl="0"/>
+            <a:r>
+              <a:rPr lang="en-US" b="0" i="0" u="none" strike="noStrike" baseline="0" dirty="0">
+                <a:latin typeface="Arial" panose="020B0604020202020204" pitchFamily="34" charset="0"/>
+              </a:rPr>
+              <a:t>Readability</a:t>
+            </a:r>
+          </a:p>
+          <a:p>
+            <a:pPr lvl="1"/>
+            <a:r>
+              <a:rPr lang="en-US" b="0" i="0" u="none" strike="noStrike" baseline="0" dirty="0">
+                <a:latin typeface="Arial" panose="020B0604020202020204" pitchFamily="34" charset="0"/>
+              </a:rPr>
+              <a:t>Don't Use Aliases</a:t>
+            </a:r>
+          </a:p>
+          <a:p>
+            <a:pPr marR="0" lvl="0" rtl="0"/>
+            <a:r>
+              <a:rPr lang="en-US" b="0" i="0" u="none" strike="noStrike" baseline="0" dirty="0">
+                <a:latin typeface="Arial" panose="020B0604020202020204" pitchFamily="34" charset="0"/>
+              </a:rPr>
+              <a:t>Verb-Noun</a:t>
+            </a:r>
+          </a:p>
+          <a:p>
+            <a:pPr marR="0" lvl="0" rtl="0"/>
+            <a:r>
+              <a:rPr lang="en-US" b="0" i="0" u="none" strike="noStrike" baseline="0" dirty="0">
+                <a:latin typeface="Arial" panose="020B0604020202020204" pitchFamily="34" charset="0"/>
+              </a:rPr>
+              <a:t>$null on left side comparison</a:t>
+            </a:r>
+          </a:p>
+          <a:p>
+            <a:pPr marR="0" lvl="0" rtl="0"/>
+            <a:r>
+              <a:rPr lang="en-US" b="0" i="0" u="none" strike="noStrike" baseline="0" dirty="0" err="1">
+                <a:latin typeface="Arial" panose="020B0604020202020204" pitchFamily="34" charset="0"/>
+              </a:rPr>
+              <a:t>VSCode</a:t>
+            </a:r>
+            <a:r>
+              <a:rPr lang="en-US" b="0" i="0" u="none" strike="noStrike" baseline="0" dirty="0">
+                <a:latin typeface="Arial" panose="020B0604020202020204" pitchFamily="34" charset="0"/>
+              </a:rPr>
+              <a:t> Extensions</a:t>
+            </a:r>
+          </a:p>
+        </p:txBody>
+      </p:sp>
+      <p:sp>
+        <p:nvSpPr>
+          <p:cNvPr id="4" name="Footer Placeholder 3">
+            <a:extLst>
+              <a:ext uri="{FF2B5EF4-FFF2-40B4-BE49-F238E27FC236}">
+                <a16:creationId xmlns:a16="http://schemas.microsoft.com/office/drawing/2014/main" id="{DFC4B1A9-C5E5-6767-5A67-3AFFF61F8AE3}"/>
+              </a:ext>
+            </a:extLst>
+          </p:cNvPr>
+          <p:cNvSpPr>
+            <a:spLocks noGrp="1"/>
+          </p:cNvSpPr>
+          <p:nvPr>
+            <p:ph type="ftr" sz="quarter" idx="11"/>
+          </p:nvPr>
+        </p:nvSpPr>
+        <p:spPr/>
+        <p:txBody>
+          <a:bodyPr/>
+          <a:lstStyle/>
+          <a:p>
+            <a:r>
+              <a:rPr lang="sv-SE"/>
+              <a:t>Björn Sundling  bjorn.sundling@advania.com</a:t>
+            </a:r>
+            <a:endParaRPr lang="en-SE"/>
+          </a:p>
+        </p:txBody>
+      </p:sp>
+      <p:sp>
+        <p:nvSpPr>
+          <p:cNvPr id="5" name="Slide Number Placeholder 4">
+            <a:extLst>
+              <a:ext uri="{FF2B5EF4-FFF2-40B4-BE49-F238E27FC236}">
+                <a16:creationId xmlns:a16="http://schemas.microsoft.com/office/drawing/2014/main" id="{BAD258B7-9534-6ABE-261E-70D2894B8FD8}"/>
+              </a:ext>
+            </a:extLst>
+          </p:cNvPr>
+          <p:cNvSpPr>
+            <a:spLocks noGrp="1"/>
+          </p:cNvSpPr>
+          <p:nvPr>
+            <p:ph type="sldNum" sz="quarter" idx="12"/>
+          </p:nvPr>
+        </p:nvSpPr>
+        <p:spPr/>
+        <p:txBody>
+          <a:bodyPr/>
+          <a:lstStyle/>
+          <a:p>
+            <a:fld id="{9993A830-6DA6-4394-A358-10250CDB3A67}" type="slidenum">
+              <a:rPr lang="en-SE" smtClean="0"/>
+              <a:t>71</a:t>
+            </a:fld>
+            <a:endParaRPr lang="en-SE"/>
+          </a:p>
+        </p:txBody>
+      </p:sp>
+    </p:spTree>
+    <p:extLst>
+      <p:ext uri="{BB962C8B-B14F-4D97-AF65-F5344CB8AC3E}">
+        <p14:creationId xmlns:p14="http://schemas.microsoft.com/office/powerpoint/2010/main" val="3802939393"/>
+      </p:ext>
+    </p:extLst>
+  </p:cSld>
+  <p:clrMapOvr>
+    <a:masterClrMapping/>
+  </p:clrMapOvr>
+</p:sld>
+</file>
+
+<file path=ppt/slides/slide72.xml><?xml version="1.0" encoding="utf-8"?>
+<p:sld xmlns:a="http://schemas.openxmlformats.org/drawingml/2006/main" xmlns:r="http://schemas.openxmlformats.org/officeDocument/2006/relationships" xmlns:p="http://schemas.openxmlformats.org/presentationml/2006/main">
+  <p:cSld>
+    <p:spTree>
+      <p:nvGrpSpPr>
+        <p:cNvPr id="1" name=""/>
+        <p:cNvGrpSpPr/>
+        <p:nvPr/>
+      </p:nvGrpSpPr>
+      <p:grpSpPr>
+        <a:xfrm>
+          <a:off x="0" y="0"/>
+          <a:ext cx="0" cy="0"/>
+          <a:chOff x="0" y="0"/>
+          <a:chExt cx="0" cy="0"/>
+        </a:xfrm>
+      </p:grpSpPr>
+      <p:sp>
+        <p:nvSpPr>
+          <p:cNvPr id="2" name="Title 1">
+            <a:extLst>
+              <a:ext uri="{FF2B5EF4-FFF2-40B4-BE49-F238E27FC236}">
+                <a16:creationId xmlns:a16="http://schemas.microsoft.com/office/drawing/2014/main" id="{020D5667-3F2E-0371-B2AF-410D252A6CEA}"/>
+              </a:ext>
+            </a:extLst>
+          </p:cNvPr>
+          <p:cNvSpPr>
+            <a:spLocks noGrp="1"/>
+          </p:cNvSpPr>
+          <p:nvPr>
+            <p:ph type="title"/>
+          </p:nvPr>
+        </p:nvSpPr>
+        <p:spPr>
+          <a:xfrm>
+            <a:off x="838200" y="365125"/>
+            <a:ext cx="10515600" cy="1325563"/>
+          </a:xfrm>
+        </p:spPr>
+        <p:txBody>
+          <a:bodyPr/>
+          <a:lstStyle/>
+          <a:p>
+            <a:pPr marR="0" rtl="0"/>
+            <a:r>
+              <a:rPr lang="en-GB" b="1" i="0" u="none" strike="noStrike" baseline="0" dirty="0">
+                <a:latin typeface="Arial" panose="020B0604020202020204" pitchFamily="34" charset="0"/>
+              </a:rPr>
+              <a:t>Best Practices</a:t>
+            </a:r>
+            <a:endParaRPr lang="en-GB" b="0" i="0" u="none" strike="noStrike" baseline="0" dirty="0">
+              <a:latin typeface="Arial" panose="020B0604020202020204" pitchFamily="34" charset="0"/>
+            </a:endParaRPr>
+          </a:p>
+        </p:txBody>
+      </p:sp>
+      <p:sp>
+        <p:nvSpPr>
+          <p:cNvPr id="3" name="Text Placeholder 2">
+            <a:extLst>
+              <a:ext uri="{FF2B5EF4-FFF2-40B4-BE49-F238E27FC236}">
+                <a16:creationId xmlns:a16="http://schemas.microsoft.com/office/drawing/2014/main" id="{14842F41-DE27-3397-05EB-81DCA4DF63A8}"/>
+              </a:ext>
+            </a:extLst>
+          </p:cNvPr>
+          <p:cNvSpPr>
+            <a:spLocks noGrp="1"/>
+          </p:cNvSpPr>
+          <p:nvPr>
+            <p:ph type="body" idx="1"/>
+          </p:nvPr>
+        </p:nvSpPr>
+        <p:spPr/>
+        <p:txBody>
+          <a:bodyPr>
             <a:normAutofit/>
           </a:bodyPr>
           <a:lstStyle/>
@@ -19210,7 +19443,7 @@
           <a:p>
             <a:fld id="{9993A830-6DA6-4394-A358-10250CDB3A67}" type="slidenum">
               <a:rPr lang="en-SE" smtClean="0"/>
-              <a:t>71</a:t>
+              <a:t>72</a:t>
             </a:fld>
             <a:endParaRPr lang="en-SE"/>
           </a:p>
@@ -19314,150 +19547,6 @@
 </p:sld>
 </file>
 
-<file path=ppt/slides/slide72.xml><?xml version="1.0" encoding="utf-8"?>
-<p:sld xmlns:a="http://schemas.openxmlformats.org/drawingml/2006/main" xmlns:r="http://schemas.openxmlformats.org/officeDocument/2006/relationships" xmlns:p="http://schemas.openxmlformats.org/presentationml/2006/main" show="0">
-  <p:cSld>
-    <p:spTree>
-      <p:nvGrpSpPr>
-        <p:cNvPr id="1" name=""/>
-        <p:cNvGrpSpPr/>
-        <p:nvPr/>
-      </p:nvGrpSpPr>
-      <p:grpSpPr>
-        <a:xfrm>
-          <a:off x="0" y="0"/>
-          <a:ext cx="0" cy="0"/>
-          <a:chOff x="0" y="0"/>
-          <a:chExt cx="0" cy="0"/>
-        </a:xfrm>
-      </p:grpSpPr>
-      <p:sp>
-        <p:nvSpPr>
-          <p:cNvPr id="2" name="Title 1">
-            <a:extLst>
-              <a:ext uri="{FF2B5EF4-FFF2-40B4-BE49-F238E27FC236}">
-                <a16:creationId xmlns:a16="http://schemas.microsoft.com/office/drawing/2014/main" id="{55D23047-3833-EFE0-8A01-090ACFE1D9FC}"/>
-              </a:ext>
-            </a:extLst>
-          </p:cNvPr>
-          <p:cNvSpPr>
-            <a:spLocks noGrp="1"/>
-          </p:cNvSpPr>
-          <p:nvPr>
-            <p:ph type="title"/>
-          </p:nvPr>
-        </p:nvSpPr>
-        <p:spPr/>
-        <p:txBody>
-          <a:bodyPr/>
-          <a:lstStyle/>
-          <a:p>
-            <a:r>
-              <a:rPr lang="en-GB" b="1" i="0" u="none" strike="noStrike" baseline="0" dirty="0">
-                <a:latin typeface="Arial" panose="020B0604020202020204" pitchFamily="34" charset="0"/>
-              </a:rPr>
-              <a:t>Chapter name</a:t>
-            </a:r>
-            <a:endParaRPr lang="en-SE" dirty="0"/>
-          </a:p>
-        </p:txBody>
-      </p:sp>
-      <p:sp>
-        <p:nvSpPr>
-          <p:cNvPr id="3" name="Text Placeholder 2">
-            <a:extLst>
-              <a:ext uri="{FF2B5EF4-FFF2-40B4-BE49-F238E27FC236}">
-                <a16:creationId xmlns:a16="http://schemas.microsoft.com/office/drawing/2014/main" id="{1F80B5F8-E4FB-9CDB-0C7C-EEDCB4B8AF1D}"/>
-              </a:ext>
-            </a:extLst>
-          </p:cNvPr>
-          <p:cNvSpPr>
-            <a:spLocks noGrp="1"/>
-          </p:cNvSpPr>
-          <p:nvPr>
-            <p:ph type="body" idx="1"/>
-          </p:nvPr>
-        </p:nvSpPr>
-        <p:spPr/>
-        <p:txBody>
-          <a:bodyPr/>
-          <a:lstStyle/>
-          <a:p>
-            <a:endParaRPr lang="en-SE"/>
-          </a:p>
-        </p:txBody>
-      </p:sp>
-      <p:sp>
-        <p:nvSpPr>
-          <p:cNvPr id="4" name="Footer Placeholder 3">
-            <a:extLst>
-              <a:ext uri="{FF2B5EF4-FFF2-40B4-BE49-F238E27FC236}">
-                <a16:creationId xmlns:a16="http://schemas.microsoft.com/office/drawing/2014/main" id="{AFF17C74-066C-F6D3-8B07-3A4273A5590B}"/>
-              </a:ext>
-            </a:extLst>
-          </p:cNvPr>
-          <p:cNvSpPr>
-            <a:spLocks noGrp="1"/>
-          </p:cNvSpPr>
-          <p:nvPr>
-            <p:ph type="ftr" sz="quarter" idx="11"/>
-          </p:nvPr>
-        </p:nvSpPr>
-        <p:spPr/>
-        <p:txBody>
-          <a:bodyPr/>
-          <a:lstStyle/>
-          <a:p>
-            <a:r>
-              <a:rPr lang="sv-SE"/>
-              <a:t>Björn Sundling  bjorn.sundling@advania.com</a:t>
-            </a:r>
-            <a:endParaRPr lang="en-SE"/>
-          </a:p>
-        </p:txBody>
-      </p:sp>
-      <p:sp>
-        <p:nvSpPr>
-          <p:cNvPr id="5" name="Slide Number Placeholder 4">
-            <a:extLst>
-              <a:ext uri="{FF2B5EF4-FFF2-40B4-BE49-F238E27FC236}">
-                <a16:creationId xmlns:a16="http://schemas.microsoft.com/office/drawing/2014/main" id="{20FE1399-C7F6-1C33-DF5B-DE42A78C5F7F}"/>
-              </a:ext>
-            </a:extLst>
-          </p:cNvPr>
-          <p:cNvSpPr>
-            <a:spLocks noGrp="1"/>
-          </p:cNvSpPr>
-          <p:nvPr>
-            <p:ph type="sldNum" sz="quarter" idx="12"/>
-          </p:nvPr>
-        </p:nvSpPr>
-        <p:spPr/>
-        <p:txBody>
-          <a:bodyPr/>
-          <a:lstStyle/>
-          <a:p>
-            <a:fld id="{BFEA1545-8540-491B-83AB-51C306516EA6}" type="slidenum">
-              <a:rPr lang="en-SE" smtClean="0"/>
-              <a:t>72</a:t>
-            </a:fld>
-            <a:endParaRPr lang="en-SE"/>
-          </a:p>
-        </p:txBody>
-      </p:sp>
-    </p:spTree>
-    <p:extLst>
-      <p:ext uri="{BB962C8B-B14F-4D97-AF65-F5344CB8AC3E}">
-        <p14:creationId xmlns:p14="http://schemas.microsoft.com/office/powerpoint/2010/main" val="2146787524"/>
-      </p:ext>
-    </p:extLst>
-  </p:cSld>
-  <p:clrMapOvr>
-    <a:masterClrMapping/>
-  </p:clrMapOvr>
-</p:sld>
-</file>
-
 <file path=ppt/slides/slide73.xml><?xml version="1.0" encoding="utf-8"?>
 <p:sld xmlns:a="http://schemas.openxmlformats.org/drawingml/2006/main" xmlns:r="http://schemas.openxmlformats.org/officeDocument/2006/relationships" xmlns:p="http://schemas.openxmlformats.org/presentationml/2006/main" show="0">
   <p:cSld>
@@ -19480,7 +19569,7 @@
           <p:cNvPr id="2" name="Title 1">
             <a:extLst>
               <a:ext uri="{FF2B5EF4-FFF2-40B4-BE49-F238E27FC236}">
-                <a16:creationId xmlns:a16="http://schemas.microsoft.com/office/drawing/2014/main" id="{020D5667-3F2E-0371-B2AF-410D252A6CEA}"/>
+                <a16:creationId xmlns:a16="http://schemas.microsoft.com/office/drawing/2014/main" id="{55D23047-3833-EFE0-8A01-090ACFE1D9FC}"/>
               </a:ext>
             </a:extLst>
           </p:cNvPr>
@@ -19491,26 +19580,18 @@
             <p:ph type="title"/>
           </p:nvPr>
         </p:nvSpPr>
-        <p:spPr>
-          <a:xfrm>
-            <a:off x="838200" y="365125"/>
-            <a:ext cx="10515600" cy="1325563"/>
-          </a:xfrm>
-        </p:spPr>
-        <p:txBody>
-          <a:bodyPr/>
-          <a:lstStyle/>
-          <a:p>
-            <a:pPr marR="0" rtl="0"/>
+        <p:spPr/>
+        <p:txBody>
+          <a:bodyPr/>
+          <a:lstStyle/>
+          <a:p>
             <a:r>
               <a:rPr lang="en-GB" b="1" i="0" u="none" strike="noStrike" baseline="0" dirty="0">
                 <a:latin typeface="Arial" panose="020B0604020202020204" pitchFamily="34" charset="0"/>
               </a:rPr>
               <a:t>Chapter name</a:t>
             </a:r>
-            <a:endParaRPr lang="en-GB" b="0" i="0" u="none" strike="noStrike" baseline="0" dirty="0">
-              <a:latin typeface="Arial" panose="020B0604020202020204" pitchFamily="34" charset="0"/>
-            </a:endParaRPr>
+            <a:endParaRPr lang="en-SE" dirty="0"/>
           </a:p>
         </p:txBody>
       </p:sp>
@@ -19519,7 +19600,7 @@
           <p:cNvPr id="3" name="Text Placeholder 2">
             <a:extLst>
               <a:ext uri="{FF2B5EF4-FFF2-40B4-BE49-F238E27FC236}">
-                <a16:creationId xmlns:a16="http://schemas.microsoft.com/office/drawing/2014/main" id="{14842F41-DE27-3397-05EB-81DCA4DF63A8}"/>
+                <a16:creationId xmlns:a16="http://schemas.microsoft.com/office/drawing/2014/main" id="{1F80B5F8-E4FB-9CDB-0C7C-EEDCB4B8AF1D}"/>
               </a:ext>
             </a:extLst>
           </p:cNvPr>
@@ -19532,30 +19613,10 @@
         </p:nvSpPr>
         <p:spPr/>
         <p:txBody>
-          <a:bodyPr>
-            <a:normAutofit/>
-          </a:bodyPr>
-          <a:lstStyle/>
-          <a:p>
-            <a:pPr marR="0" lvl="0" rtl="0"/>
-            <a:r>
-              <a:rPr lang="en-US" b="0" i="0" u="none" strike="noStrike" baseline="0" dirty="0">
-                <a:latin typeface="Arial" panose="020B0604020202020204" pitchFamily="34" charset="0"/>
-              </a:rPr>
-              <a:t>Text goes here</a:t>
-            </a:r>
-          </a:p>
-          <a:p>
-            <a:pPr lvl="1"/>
-            <a:r>
-              <a:rPr lang="en-US" dirty="0">
-                <a:latin typeface="Arial" panose="020B0604020202020204" pitchFamily="34" charset="0"/>
-              </a:rPr>
-              <a:t>Or here</a:t>
-            </a:r>
-            <a:endParaRPr lang="en-GB" b="0" i="0" u="none" strike="noStrike" baseline="0" dirty="0">
-              <a:latin typeface="Arial" panose="020B0604020202020204" pitchFamily="34" charset="0"/>
-            </a:endParaRPr>
+          <a:bodyPr/>
+          <a:lstStyle/>
+          <a:p>
+            <a:endParaRPr lang="en-SE"/>
           </a:p>
         </p:txBody>
       </p:sp>
@@ -19564,7 +19625,7 @@
           <p:cNvPr id="4" name="Footer Placeholder 3">
             <a:extLst>
               <a:ext uri="{FF2B5EF4-FFF2-40B4-BE49-F238E27FC236}">
-                <a16:creationId xmlns:a16="http://schemas.microsoft.com/office/drawing/2014/main" id="{DFC4B1A9-C5E5-6767-5A67-3AFFF61F8AE3}"/>
+                <a16:creationId xmlns:a16="http://schemas.microsoft.com/office/drawing/2014/main" id="{AFF17C74-066C-F6D3-8B07-3A4273A5590B}"/>
               </a:ext>
             </a:extLst>
           </p:cNvPr>
@@ -19593,7 +19654,7 @@
           <p:cNvPr id="5" name="Slide Number Placeholder 4">
             <a:extLst>
               <a:ext uri="{FF2B5EF4-FFF2-40B4-BE49-F238E27FC236}">
-                <a16:creationId xmlns:a16="http://schemas.microsoft.com/office/drawing/2014/main" id="{BAD258B7-9534-6ABE-261E-70D2894B8FD8}"/>
+                <a16:creationId xmlns:a16="http://schemas.microsoft.com/office/drawing/2014/main" id="{20FE1399-C7F6-1C33-DF5B-DE42A78C5F7F}"/>
               </a:ext>
             </a:extLst>
           </p:cNvPr>
@@ -19609,7 +19670,7 @@
           <a:bodyPr/>
           <a:lstStyle/>
           <a:p>
-            <a:fld id="{9993A830-6DA6-4394-A358-10250CDB3A67}" type="slidenum">
+            <a:fld id="{BFEA1545-8540-491B-83AB-51C306516EA6}" type="slidenum">
               <a:rPr lang="en-SE" smtClean="0"/>
               <a:t>73</a:t>
             </a:fld>
@@ -19620,7 +19681,7 @@
     </p:spTree>
     <p:extLst>
       <p:ext uri="{BB962C8B-B14F-4D97-AF65-F5344CB8AC3E}">
-        <p14:creationId xmlns:p14="http://schemas.microsoft.com/office/powerpoint/2010/main" val="240548692"/>
+        <p14:creationId xmlns:p14="http://schemas.microsoft.com/office/powerpoint/2010/main" val="2146787524"/>
       </p:ext>
     </p:extLst>
   </p:cSld>
@@ -19652,6 +19713,178 @@
           <p:cNvPr id="2" name="Title 1">
             <a:extLst>
               <a:ext uri="{FF2B5EF4-FFF2-40B4-BE49-F238E27FC236}">
+                <a16:creationId xmlns:a16="http://schemas.microsoft.com/office/drawing/2014/main" id="{020D5667-3F2E-0371-B2AF-410D252A6CEA}"/>
+              </a:ext>
+            </a:extLst>
+          </p:cNvPr>
+          <p:cNvSpPr>
+            <a:spLocks noGrp="1"/>
+          </p:cNvSpPr>
+          <p:nvPr>
+            <p:ph type="title"/>
+          </p:nvPr>
+        </p:nvSpPr>
+        <p:spPr>
+          <a:xfrm>
+            <a:off x="838200" y="365125"/>
+            <a:ext cx="10515600" cy="1325563"/>
+          </a:xfrm>
+        </p:spPr>
+        <p:txBody>
+          <a:bodyPr/>
+          <a:lstStyle/>
+          <a:p>
+            <a:pPr marR="0" rtl="0"/>
+            <a:r>
+              <a:rPr lang="en-GB" b="1" i="0" u="none" strike="noStrike" baseline="0" dirty="0">
+                <a:latin typeface="Arial" panose="020B0604020202020204" pitchFamily="34" charset="0"/>
+              </a:rPr>
+              <a:t>Chapter name</a:t>
+            </a:r>
+            <a:endParaRPr lang="en-GB" b="0" i="0" u="none" strike="noStrike" baseline="0" dirty="0">
+              <a:latin typeface="Arial" panose="020B0604020202020204" pitchFamily="34" charset="0"/>
+            </a:endParaRPr>
+          </a:p>
+        </p:txBody>
+      </p:sp>
+      <p:sp>
+        <p:nvSpPr>
+          <p:cNvPr id="3" name="Text Placeholder 2">
+            <a:extLst>
+              <a:ext uri="{FF2B5EF4-FFF2-40B4-BE49-F238E27FC236}">
+                <a16:creationId xmlns:a16="http://schemas.microsoft.com/office/drawing/2014/main" id="{14842F41-DE27-3397-05EB-81DCA4DF63A8}"/>
+              </a:ext>
+            </a:extLst>
+          </p:cNvPr>
+          <p:cNvSpPr>
+            <a:spLocks noGrp="1"/>
+          </p:cNvSpPr>
+          <p:nvPr>
+            <p:ph type="body" idx="1"/>
+          </p:nvPr>
+        </p:nvSpPr>
+        <p:spPr/>
+        <p:txBody>
+          <a:bodyPr>
+            <a:normAutofit/>
+          </a:bodyPr>
+          <a:lstStyle/>
+          <a:p>
+            <a:pPr marR="0" lvl="0" rtl="0"/>
+            <a:r>
+              <a:rPr lang="en-US" b="0" i="0" u="none" strike="noStrike" baseline="0" dirty="0">
+                <a:latin typeface="Arial" panose="020B0604020202020204" pitchFamily="34" charset="0"/>
+              </a:rPr>
+              <a:t>Text goes here</a:t>
+            </a:r>
+          </a:p>
+          <a:p>
+            <a:pPr lvl="1"/>
+            <a:r>
+              <a:rPr lang="en-US" dirty="0">
+                <a:latin typeface="Arial" panose="020B0604020202020204" pitchFamily="34" charset="0"/>
+              </a:rPr>
+              <a:t>Or here</a:t>
+            </a:r>
+            <a:endParaRPr lang="en-GB" b="0" i="0" u="none" strike="noStrike" baseline="0" dirty="0">
+              <a:latin typeface="Arial" panose="020B0604020202020204" pitchFamily="34" charset="0"/>
+            </a:endParaRPr>
+          </a:p>
+        </p:txBody>
+      </p:sp>
+      <p:sp>
+        <p:nvSpPr>
+          <p:cNvPr id="4" name="Footer Placeholder 3">
+            <a:extLst>
+              <a:ext uri="{FF2B5EF4-FFF2-40B4-BE49-F238E27FC236}">
+                <a16:creationId xmlns:a16="http://schemas.microsoft.com/office/drawing/2014/main" id="{DFC4B1A9-C5E5-6767-5A67-3AFFF61F8AE3}"/>
+              </a:ext>
+            </a:extLst>
+          </p:cNvPr>
+          <p:cNvSpPr>
+            <a:spLocks noGrp="1"/>
+          </p:cNvSpPr>
+          <p:nvPr>
+            <p:ph type="ftr" sz="quarter" idx="11"/>
+          </p:nvPr>
+        </p:nvSpPr>
+        <p:spPr/>
+        <p:txBody>
+          <a:bodyPr/>
+          <a:lstStyle/>
+          <a:p>
+            <a:r>
+              <a:rPr lang="sv-SE"/>
+              <a:t>Björn Sundling  bjorn.sundling@advania.com</a:t>
+            </a:r>
+            <a:endParaRPr lang="en-SE"/>
+          </a:p>
+        </p:txBody>
+      </p:sp>
+      <p:sp>
+        <p:nvSpPr>
+          <p:cNvPr id="5" name="Slide Number Placeholder 4">
+            <a:extLst>
+              <a:ext uri="{FF2B5EF4-FFF2-40B4-BE49-F238E27FC236}">
+                <a16:creationId xmlns:a16="http://schemas.microsoft.com/office/drawing/2014/main" id="{BAD258B7-9534-6ABE-261E-70D2894B8FD8}"/>
+              </a:ext>
+            </a:extLst>
+          </p:cNvPr>
+          <p:cNvSpPr>
+            <a:spLocks noGrp="1"/>
+          </p:cNvSpPr>
+          <p:nvPr>
+            <p:ph type="sldNum" sz="quarter" idx="12"/>
+          </p:nvPr>
+        </p:nvSpPr>
+        <p:spPr/>
+        <p:txBody>
+          <a:bodyPr/>
+          <a:lstStyle/>
+          <a:p>
+            <a:fld id="{9993A830-6DA6-4394-A358-10250CDB3A67}" type="slidenum">
+              <a:rPr lang="en-SE" smtClean="0"/>
+              <a:t>74</a:t>
+            </a:fld>
+            <a:endParaRPr lang="en-SE"/>
+          </a:p>
+        </p:txBody>
+      </p:sp>
+    </p:spTree>
+    <p:extLst>
+      <p:ext uri="{BB962C8B-B14F-4D97-AF65-F5344CB8AC3E}">
+        <p14:creationId xmlns:p14="http://schemas.microsoft.com/office/powerpoint/2010/main" val="240548692"/>
+      </p:ext>
+    </p:extLst>
+  </p:cSld>
+  <p:clrMapOvr>
+    <a:masterClrMapping/>
+  </p:clrMapOvr>
+</p:sld>
+</file>
+
+<file path=ppt/slides/slide75.xml><?xml version="1.0" encoding="utf-8"?>
+<p:sld xmlns:a="http://schemas.openxmlformats.org/drawingml/2006/main" xmlns:r="http://schemas.openxmlformats.org/officeDocument/2006/relationships" xmlns:p="http://schemas.openxmlformats.org/presentationml/2006/main" show="0">
+  <p:cSld>
+    <p:spTree>
+      <p:nvGrpSpPr>
+        <p:cNvPr id="1" name=""/>
+        <p:cNvGrpSpPr/>
+        <p:nvPr/>
+      </p:nvGrpSpPr>
+      <p:grpSpPr>
+        <a:xfrm>
+          <a:off x="0" y="0"/>
+          <a:ext cx="0" cy="0"/>
+          <a:chOff x="0" y="0"/>
+          <a:chExt cx="0" cy="0"/>
+        </a:xfrm>
+      </p:grpSpPr>
+      <p:sp>
+        <p:nvSpPr>
+          <p:cNvPr id="2" name="Title 1">
+            <a:extLst>
+              <a:ext uri="{FF2B5EF4-FFF2-40B4-BE49-F238E27FC236}">
                 <a16:creationId xmlns:a16="http://schemas.microsoft.com/office/drawing/2014/main" id="{69BCD6E1-D5BF-EF3E-F0CC-EDE7BAE35861}"/>
               </a:ext>
             </a:extLst>
@@ -19811,7 +20044,7 @@
           <a:p>
             <a:fld id="{BFEA1545-8540-491B-83AB-51C306516EA6}" type="slidenum">
               <a:rPr lang="en-SE" smtClean="0"/>
-              <a:t>74</a:t>
+              <a:t>75</a:t>
             </a:fld>
             <a:endParaRPr lang="en-SE"/>
           </a:p>
@@ -19830,7 +20063,7 @@
 </p:sld>
 </file>
 
-<file path=ppt/slides/slide75.xml><?xml version="1.0" encoding="utf-8"?>
+<file path=ppt/slides/slide76.xml><?xml version="1.0" encoding="utf-8"?>
 <p:sld xmlns:a="http://schemas.openxmlformats.org/drawingml/2006/main" xmlns:r="http://schemas.openxmlformats.org/officeDocument/2006/relationships" xmlns:p="http://schemas.openxmlformats.org/presentationml/2006/main">
   <p:cSld>
     <p:spTree>

</xml_diff>